<commit_message>
Updated localities analyses using conspecific corrections & not rounding to 0
</commit_message>
<xml_diff>
--- a/01_Localities/02_Cumulatives/figures/01_Prezygotics.pptx
+++ b/01_Localities/02_Cumulatives/figures/01_Prezygotics.pptx
@@ -3091,7 +3091,7 @@
           </p:nvSpPr>
           <p:spPr>
             <a:xfrm>
-              <a:off x="585250" y="1380178"/>
+              <a:off x="585250" y="1232598"/>
               <a:ext cx="1331687" cy="0"/>
             </a:xfrm>
             <a:custGeom>
@@ -3134,7 +3134,7 @@
           </p:nvSpPr>
           <p:spPr>
             <a:xfrm>
-              <a:off x="585250" y="1120128"/>
+              <a:off x="585250" y="935058"/>
               <a:ext cx="1331687" cy="0"/>
             </a:xfrm>
             <a:custGeom>
@@ -3177,7 +3177,7 @@
           </p:nvSpPr>
           <p:spPr>
             <a:xfrm>
-              <a:off x="585250" y="860078"/>
+              <a:off x="585250" y="637518"/>
               <a:ext cx="1331687" cy="0"/>
             </a:xfrm>
             <a:custGeom>
@@ -3220,7 +3220,7 @@
           </p:nvSpPr>
           <p:spPr>
             <a:xfrm>
-              <a:off x="585250" y="600028"/>
+              <a:off x="585250" y="339978"/>
               <a:ext cx="1331687" cy="0"/>
             </a:xfrm>
             <a:custGeom>
@@ -3263,7 +3263,7 @@
           </p:nvSpPr>
           <p:spPr>
             <a:xfrm>
-              <a:off x="585250" y="339978"/>
+              <a:off x="585250" y="935058"/>
               <a:ext cx="1331687" cy="0"/>
             </a:xfrm>
             <a:custGeom>
@@ -3284,7 +3284,7 @@
             </a:custGeom>
             <a:ln w="13550" cap="flat">
               <a:solidFill>
-                <a:srgbClr val="BEBEBE">
+                <a:srgbClr val="000000">
                   <a:alpha val="100000"/>
                 </a:srgbClr>
               </a:solidFill>
@@ -3306,27 +3306,27 @@
           </p:nvSpPr>
           <p:spPr>
             <a:xfrm>
-              <a:off x="738906" y="765420"/>
-              <a:ext cx="1024375" cy="614757"/>
+              <a:off x="738906" y="740467"/>
+              <a:ext cx="1024375" cy="326103"/>
             </a:xfrm>
             <a:custGeom>
               <a:avLst/>
               <a:pathLst>
-                <a:path w="1024375" h="614757">
+                <a:path w="1024375" h="326103">
                   <a:moveTo>
-                    <a:pt x="0" y="614757"/>
+                    <a:pt x="0" y="218394"/>
                   </a:moveTo>
                   <a:lnTo>
-                    <a:pt x="256093" y="268371"/>
-                  </a:lnTo>
-                  <a:lnTo>
-                    <a:pt x="512187" y="158110"/>
-                  </a:lnTo>
-                  <a:lnTo>
-                    <a:pt x="768281" y="158110"/>
-                  </a:lnTo>
-                  <a:lnTo>
-                    <a:pt x="1024375" y="0"/>
+                    <a:pt x="256093" y="47011"/>
+                  </a:lnTo>
+                  <a:lnTo>
+                    <a:pt x="512187" y="0"/>
+                  </a:lnTo>
+                  <a:lnTo>
+                    <a:pt x="768281" y="285638"/>
+                  </a:lnTo>
+                  <a:lnTo>
+                    <a:pt x="1024375" y="326103"/>
                   </a:lnTo>
                 </a:path>
               </a:pathLst>
@@ -3355,24 +3355,24 @@
           </p:nvSpPr>
           <p:spPr>
             <a:xfrm>
-              <a:off x="738906" y="660360"/>
-              <a:ext cx="1024375" cy="719817"/>
+              <a:off x="738906" y="793429"/>
+              <a:ext cx="1024375" cy="170787"/>
             </a:xfrm>
             <a:custGeom>
               <a:avLst/>
               <a:pathLst>
-                <a:path w="1024375" h="719817">
+                <a:path w="1024375" h="170787">
                   <a:moveTo>
-                    <a:pt x="0" y="719817"/>
+                    <a:pt x="0" y="165432"/>
                   </a:moveTo>
                   <a:lnTo>
-                    <a:pt x="256093" y="589793"/>
-                  </a:lnTo>
-                  <a:lnTo>
-                    <a:pt x="512187" y="589793"/>
-                  </a:lnTo>
-                  <a:lnTo>
-                    <a:pt x="768281" y="218441"/>
+                    <a:pt x="256093" y="134488"/>
+                  </a:lnTo>
+                  <a:lnTo>
+                    <a:pt x="512187" y="170787"/>
+                  </a:lnTo>
+                  <a:lnTo>
+                    <a:pt x="768281" y="72004"/>
                   </a:lnTo>
                   <a:lnTo>
                     <a:pt x="1024375" y="0"/>
@@ -3404,27 +3404,27 @@
           </p:nvSpPr>
           <p:spPr>
             <a:xfrm>
-              <a:off x="738906" y="1075399"/>
-              <a:ext cx="1024375" cy="304778"/>
+              <a:off x="738906" y="958861"/>
+              <a:ext cx="1024375" cy="421316"/>
             </a:xfrm>
             <a:custGeom>
               <a:avLst/>
               <a:pathLst>
-                <a:path w="1024375" h="304778">
+                <a:path w="1024375" h="421316">
                   <a:moveTo>
-                    <a:pt x="0" y="304778"/>
+                    <a:pt x="0" y="0"/>
                   </a:moveTo>
                   <a:lnTo>
-                    <a:pt x="256093" y="304778"/>
-                  </a:lnTo>
-                  <a:lnTo>
-                    <a:pt x="512187" y="304778"/>
-                  </a:lnTo>
-                  <a:lnTo>
-                    <a:pt x="768281" y="251728"/>
-                  </a:lnTo>
-                  <a:lnTo>
-                    <a:pt x="1024375" y="0"/>
+                    <a:pt x="256093" y="52962"/>
+                  </a:lnTo>
+                  <a:lnTo>
+                    <a:pt x="512187" y="94617"/>
+                  </a:lnTo>
+                  <a:lnTo>
+                    <a:pt x="768281" y="343360"/>
+                  </a:lnTo>
+                  <a:lnTo>
+                    <a:pt x="1024375" y="421316"/>
                   </a:lnTo>
                 </a:path>
               </a:pathLst>
@@ -3453,27 +3453,27 @@
           </p:nvSpPr>
           <p:spPr>
             <a:xfrm>
-              <a:off x="738906" y="804947"/>
-              <a:ext cx="1024375" cy="315180"/>
+              <a:off x="738906" y="696431"/>
+              <a:ext cx="1024375" cy="301705"/>
             </a:xfrm>
             <a:custGeom>
               <a:avLst/>
               <a:pathLst>
-                <a:path w="1024375" h="315180">
+                <a:path w="1024375" h="301705">
                   <a:moveTo>
-                    <a:pt x="0" y="315180"/>
+                    <a:pt x="0" y="107709"/>
                   </a:moveTo>
                   <a:lnTo>
-                    <a:pt x="256093" y="315180"/>
-                  </a:lnTo>
-                  <a:lnTo>
-                    <a:pt x="512187" y="55130"/>
-                  </a:lnTo>
-                  <a:lnTo>
-                    <a:pt x="768281" y="40567"/>
-                  </a:lnTo>
-                  <a:lnTo>
-                    <a:pt x="1024375" y="0"/>
+                    <a:pt x="256093" y="147579"/>
+                  </a:lnTo>
+                  <a:lnTo>
+                    <a:pt x="512187" y="0"/>
+                  </a:lnTo>
+                  <a:lnTo>
+                    <a:pt x="768281" y="136868"/>
+                  </a:lnTo>
+                  <a:lnTo>
+                    <a:pt x="1024375" y="301705"/>
                   </a:lnTo>
                 </a:path>
               </a:pathLst>
@@ -3502,7 +3502,7 @@
           </p:nvSpPr>
           <p:spPr>
             <a:xfrm>
-              <a:off x="714080" y="1355352"/>
+              <a:off x="714080" y="934035"/>
               <a:ext cx="49651" cy="49651"/>
             </a:xfrm>
             <a:prstGeom prst="ellipse">
@@ -3537,7 +3537,7 @@
           </p:nvSpPr>
           <p:spPr>
             <a:xfrm>
-              <a:off x="714080" y="1355352"/>
+              <a:off x="714080" y="934035"/>
               <a:ext cx="49651" cy="49651"/>
             </a:xfrm>
             <a:prstGeom prst="ellipse">
@@ -3572,7 +3572,7 @@
           </p:nvSpPr>
           <p:spPr>
             <a:xfrm>
-              <a:off x="714080" y="1355352"/>
+              <a:off x="714080" y="934035"/>
               <a:ext cx="49651" cy="49651"/>
             </a:xfrm>
             <a:prstGeom prst="ellipse">
@@ -3607,7 +3607,7 @@
           </p:nvSpPr>
           <p:spPr>
             <a:xfrm>
-              <a:off x="714080" y="1095302"/>
+              <a:off x="714080" y="779314"/>
               <a:ext cx="49651" cy="49651"/>
             </a:xfrm>
             <a:prstGeom prst="ellipse">
@@ -3642,7 +3642,7 @@
           </p:nvSpPr>
           <p:spPr>
             <a:xfrm>
-              <a:off x="970174" y="1008965"/>
+              <a:off x="970174" y="762652"/>
               <a:ext cx="49651" cy="49651"/>
             </a:xfrm>
             <a:prstGeom prst="ellipse">
@@ -3677,7 +3677,7 @@
           </p:nvSpPr>
           <p:spPr>
             <a:xfrm>
-              <a:off x="970174" y="1225327"/>
+              <a:off x="970174" y="903091"/>
               <a:ext cx="49651" cy="49651"/>
             </a:xfrm>
             <a:prstGeom prst="ellipse">
@@ -3712,7 +3712,7 @@
           </p:nvSpPr>
           <p:spPr>
             <a:xfrm>
-              <a:off x="970174" y="1355352"/>
+              <a:off x="970174" y="986997"/>
               <a:ext cx="49651" cy="49651"/>
             </a:xfrm>
             <a:prstGeom prst="ellipse">
@@ -3747,7 +3747,7 @@
           </p:nvSpPr>
           <p:spPr>
             <a:xfrm>
-              <a:off x="970174" y="1095302"/>
+              <a:off x="970174" y="819185"/>
               <a:ext cx="49651" cy="49651"/>
             </a:xfrm>
             <a:prstGeom prst="ellipse">
@@ -3782,7 +3782,7 @@
           </p:nvSpPr>
           <p:spPr>
             <a:xfrm>
-              <a:off x="1226268" y="898704"/>
+              <a:off x="1226268" y="715641"/>
               <a:ext cx="49651" cy="49651"/>
             </a:xfrm>
             <a:prstGeom prst="ellipse">
@@ -3817,7 +3817,7 @@
           </p:nvSpPr>
           <p:spPr>
             <a:xfrm>
-              <a:off x="1226268" y="1225327"/>
+              <a:off x="1226268" y="939391"/>
               <a:ext cx="49651" cy="49651"/>
             </a:xfrm>
             <a:prstGeom prst="ellipse">
@@ -3852,7 +3852,7 @@
           </p:nvSpPr>
           <p:spPr>
             <a:xfrm>
-              <a:off x="1226268" y="1355352"/>
+              <a:off x="1226268" y="1028653"/>
               <a:ext cx="49651" cy="49651"/>
             </a:xfrm>
             <a:prstGeom prst="ellipse">
@@ -3887,7 +3887,7 @@
           </p:nvSpPr>
           <p:spPr>
             <a:xfrm>
-              <a:off x="1226268" y="835252"/>
+              <a:off x="1226268" y="671605"/>
               <a:ext cx="49651" cy="49651"/>
             </a:xfrm>
             <a:prstGeom prst="ellipse">
@@ -3922,7 +3922,7 @@
           </p:nvSpPr>
           <p:spPr>
             <a:xfrm>
-              <a:off x="1482362" y="898704"/>
+              <a:off x="1482362" y="1001279"/>
               <a:ext cx="49651" cy="49651"/>
             </a:xfrm>
             <a:prstGeom prst="ellipse">
@@ -3957,7 +3957,7 @@
           </p:nvSpPr>
           <p:spPr>
             <a:xfrm>
-              <a:off x="1482362" y="853975"/>
+              <a:off x="1482362" y="840608"/>
               <a:ext cx="49651" cy="49651"/>
             </a:xfrm>
             <a:prstGeom prst="ellipse">
@@ -3992,7 +3992,7 @@
           </p:nvSpPr>
           <p:spPr>
             <a:xfrm>
-              <a:off x="1482362" y="1302301"/>
+              <a:off x="1482362" y="1277396"/>
               <a:ext cx="49651" cy="49651"/>
             </a:xfrm>
             <a:prstGeom prst="ellipse">
@@ -4027,7 +4027,7 @@
           </p:nvSpPr>
           <p:spPr>
             <a:xfrm>
-              <a:off x="1482362" y="820689"/>
+              <a:off x="1482362" y="808473"/>
               <a:ext cx="49651" cy="49651"/>
             </a:xfrm>
             <a:prstGeom prst="ellipse">
@@ -4062,7 +4062,7 @@
           </p:nvSpPr>
           <p:spPr>
             <a:xfrm>
-              <a:off x="1738456" y="740594"/>
+              <a:off x="1738456" y="1041745"/>
               <a:ext cx="49651" cy="49651"/>
             </a:xfrm>
             <a:prstGeom prst="ellipse">
@@ -4097,7 +4097,7 @@
           </p:nvSpPr>
           <p:spPr>
             <a:xfrm>
-              <a:off x="1738456" y="635534"/>
+              <a:off x="1738456" y="768603"/>
               <a:ext cx="49651" cy="49651"/>
             </a:xfrm>
             <a:prstGeom prst="ellipse">
@@ -4132,7 +4132,7 @@
           </p:nvSpPr>
           <p:spPr>
             <a:xfrm>
-              <a:off x="1738456" y="1050573"/>
+              <a:off x="1738456" y="1355352"/>
               <a:ext cx="49651" cy="49651"/>
             </a:xfrm>
             <a:prstGeom prst="ellipse">
@@ -4167,7 +4167,7 @@
           </p:nvSpPr>
           <p:spPr>
             <a:xfrm>
-              <a:off x="1738456" y="780121"/>
+              <a:off x="1738456" y="973310"/>
               <a:ext cx="49651" cy="49651"/>
             </a:xfrm>
             <a:prstGeom prst="ellipse">
@@ -4228,7 +4228,7 @@
           </p:nvSpPr>
           <p:spPr>
             <a:xfrm>
-              <a:off x="1986527" y="1380178"/>
+              <a:off x="1986527" y="1232598"/>
               <a:ext cx="1331687" cy="0"/>
             </a:xfrm>
             <a:custGeom>
@@ -4271,7 +4271,7 @@
           </p:nvSpPr>
           <p:spPr>
             <a:xfrm>
-              <a:off x="1986527" y="1120128"/>
+              <a:off x="1986527" y="935058"/>
               <a:ext cx="1331687" cy="0"/>
             </a:xfrm>
             <a:custGeom>
@@ -4314,7 +4314,7 @@
           </p:nvSpPr>
           <p:spPr>
             <a:xfrm>
-              <a:off x="1986527" y="860078"/>
+              <a:off x="1986527" y="637518"/>
               <a:ext cx="1331687" cy="0"/>
             </a:xfrm>
             <a:custGeom>
@@ -4357,7 +4357,7 @@
           </p:nvSpPr>
           <p:spPr>
             <a:xfrm>
-              <a:off x="1986527" y="600028"/>
+              <a:off x="1986527" y="339978"/>
               <a:ext cx="1331687" cy="0"/>
             </a:xfrm>
             <a:custGeom>
@@ -4400,7 +4400,7 @@
           </p:nvSpPr>
           <p:spPr>
             <a:xfrm>
-              <a:off x="1986527" y="339978"/>
+              <a:off x="1986527" y="935058"/>
               <a:ext cx="1331687" cy="0"/>
             </a:xfrm>
             <a:custGeom>
@@ -4421,7 +4421,7 @@
             </a:custGeom>
             <a:ln w="13550" cap="flat">
               <a:solidFill>
-                <a:srgbClr val="BEBEBE">
+                <a:srgbClr val="000000">
                   <a:alpha val="100000"/>
                 </a:srgbClr>
               </a:solidFill>
@@ -4443,24 +4443,24 @@
           </p:nvSpPr>
           <p:spPr>
             <a:xfrm>
-              <a:off x="2140183" y="491847"/>
-              <a:ext cx="1024375" cy="793672"/>
+              <a:off x="2140183" y="554802"/>
+              <a:ext cx="1024375" cy="368949"/>
             </a:xfrm>
             <a:custGeom>
               <a:avLst/>
               <a:pathLst>
-                <a:path w="1024375" h="793672">
+                <a:path w="1024375" h="368949">
                   <a:moveTo>
-                    <a:pt x="0" y="793672"/>
+                    <a:pt x="0" y="348121"/>
                   </a:moveTo>
                   <a:lnTo>
-                    <a:pt x="256093" y="699013"/>
-                  </a:lnTo>
-                  <a:lnTo>
-                    <a:pt x="512187" y="699013"/>
-                  </a:lnTo>
-                  <a:lnTo>
-                    <a:pt x="768281" y="193477"/>
+                    <a:pt x="256093" y="334434"/>
+                  </a:lnTo>
+                  <a:lnTo>
+                    <a:pt x="512187" y="368949"/>
+                  </a:lnTo>
+                  <a:lnTo>
+                    <a:pt x="768281" y="121991"/>
                   </a:lnTo>
                   <a:lnTo>
                     <a:pt x="1024375" y="0"/>
@@ -4492,7 +4492,7 @@
           </p:nvSpPr>
           <p:spPr>
             <a:xfrm>
-              <a:off x="2115357" y="1260693"/>
+              <a:off x="2115357" y="878098"/>
               <a:ext cx="49651" cy="49651"/>
             </a:xfrm>
             <a:prstGeom prst="ellipse">
@@ -4527,7 +4527,7 @@
           </p:nvSpPr>
           <p:spPr>
             <a:xfrm>
-              <a:off x="2371451" y="1166035"/>
+              <a:off x="2371451" y="864411"/>
               <a:ext cx="49651" cy="49651"/>
             </a:xfrm>
             <a:prstGeom prst="ellipse">
@@ -4562,7 +4562,7 @@
           </p:nvSpPr>
           <p:spPr>
             <a:xfrm>
-              <a:off x="2627545" y="1166035"/>
+              <a:off x="2627545" y="898925"/>
               <a:ext cx="49651" cy="49651"/>
             </a:xfrm>
             <a:prstGeom prst="ellipse">
@@ -4597,7 +4597,7 @@
           </p:nvSpPr>
           <p:spPr>
             <a:xfrm>
-              <a:off x="2883639" y="660498"/>
+              <a:off x="2883639" y="651967"/>
               <a:ext cx="49651" cy="49651"/>
             </a:xfrm>
             <a:prstGeom prst="ellipse">
@@ -4632,7 +4632,7 @@
           </p:nvSpPr>
           <p:spPr>
             <a:xfrm>
-              <a:off x="3139733" y="467021"/>
+              <a:off x="3139733" y="529976"/>
               <a:ext cx="49651" cy="49651"/>
             </a:xfrm>
             <a:prstGeom prst="ellipse">
@@ -4693,7 +4693,7 @@
           </p:nvSpPr>
           <p:spPr>
             <a:xfrm>
-              <a:off x="3387804" y="1380178"/>
+              <a:off x="3387804" y="1232598"/>
               <a:ext cx="1331687" cy="0"/>
             </a:xfrm>
             <a:custGeom>
@@ -4736,7 +4736,7 @@
           </p:nvSpPr>
           <p:spPr>
             <a:xfrm>
-              <a:off x="3387804" y="1120128"/>
+              <a:off x="3387804" y="935058"/>
               <a:ext cx="1331687" cy="0"/>
             </a:xfrm>
             <a:custGeom>
@@ -4779,7 +4779,7 @@
           </p:nvSpPr>
           <p:spPr>
             <a:xfrm>
-              <a:off x="3387804" y="860078"/>
+              <a:off x="3387804" y="637518"/>
               <a:ext cx="1331687" cy="0"/>
             </a:xfrm>
             <a:custGeom>
@@ -4822,7 +4822,7 @@
           </p:nvSpPr>
           <p:spPr>
             <a:xfrm>
-              <a:off x="3387804" y="600028"/>
+              <a:off x="3387804" y="339978"/>
               <a:ext cx="1331687" cy="0"/>
             </a:xfrm>
             <a:custGeom>
@@ -4865,7 +4865,7 @@
           </p:nvSpPr>
           <p:spPr>
             <a:xfrm>
-              <a:off x="3387804" y="339978"/>
+              <a:off x="3387804" y="935058"/>
               <a:ext cx="1331687" cy="0"/>
             </a:xfrm>
             <a:custGeom>
@@ -4886,7 +4886,7 @@
             </a:custGeom>
             <a:ln w="13550" cap="flat">
               <a:solidFill>
-                <a:srgbClr val="BEBEBE">
+                <a:srgbClr val="000000">
                   <a:alpha val="100000"/>
                 </a:srgbClr>
               </a:solidFill>
@@ -4909,23 +4909,23 @@
           <p:spPr>
             <a:xfrm>
               <a:off x="3541460" y="339978"/>
-              <a:ext cx="1024375" cy="1040199"/>
+              <a:ext cx="1024375" cy="618882"/>
             </a:xfrm>
             <a:custGeom>
               <a:avLst/>
               <a:pathLst>
-                <a:path w="1024375" h="1040199">
+                <a:path w="1024375" h="618882">
                   <a:moveTo>
-                    <a:pt x="0" y="1040199"/>
+                    <a:pt x="0" y="618882"/>
                   </a:moveTo>
                   <a:lnTo>
-                    <a:pt x="256093" y="742702"/>
-                  </a:lnTo>
-                  <a:lnTo>
-                    <a:pt x="512187" y="668848"/>
-                  </a:lnTo>
-                  <a:lnTo>
-                    <a:pt x="768281" y="62411"/>
+                    <a:pt x="256093" y="479634"/>
+                  </a:lnTo>
+                  <a:lnTo>
+                    <a:pt x="512187" y="458806"/>
+                  </a:lnTo>
+                  <a:lnTo>
+                    <a:pt x="768281" y="61293"/>
                   </a:lnTo>
                   <a:lnTo>
                     <a:pt x="1024375" y="0"/>
@@ -4958,23 +4958,23 @@
           <p:spPr>
             <a:xfrm>
               <a:off x="3541460" y="339978"/>
-              <a:ext cx="1024375" cy="842561"/>
+              <a:ext cx="1024375" cy="501057"/>
             </a:xfrm>
             <a:custGeom>
               <a:avLst/>
               <a:pathLst>
-                <a:path w="1024375" h="842561">
+                <a:path w="1024375" h="501057">
                   <a:moveTo>
-                    <a:pt x="0" y="842561"/>
+                    <a:pt x="0" y="501057"/>
                   </a:moveTo>
                   <a:lnTo>
-                    <a:pt x="256093" y="618918"/>
-                  </a:lnTo>
-                  <a:lnTo>
-                    <a:pt x="512187" y="450406"/>
-                  </a:lnTo>
-                  <a:lnTo>
-                    <a:pt x="768281" y="30165"/>
+                    <a:pt x="256093" y="399893"/>
+                  </a:lnTo>
+                  <a:lnTo>
+                    <a:pt x="512187" y="308846"/>
+                  </a:lnTo>
+                  <a:lnTo>
+                    <a:pt x="768281" y="29158"/>
                   </a:lnTo>
                   <a:lnTo>
                     <a:pt x="1024375" y="0"/>
@@ -5007,23 +5007,23 @@
           <p:spPr>
             <a:xfrm>
               <a:off x="3541460" y="339978"/>
-              <a:ext cx="1024375" cy="693812"/>
+              <a:ext cx="1024375" cy="447499"/>
             </a:xfrm>
             <a:custGeom>
               <a:avLst/>
               <a:pathLst>
-                <a:path w="1024375" h="693812">
+                <a:path w="1024375" h="447499">
                   <a:moveTo>
-                    <a:pt x="0" y="693812"/>
+                    <a:pt x="0" y="412390"/>
                   </a:moveTo>
                   <a:lnTo>
-                    <a:pt x="256093" y="693812"/>
-                  </a:lnTo>
-                  <a:lnTo>
-                    <a:pt x="512187" y="230924"/>
-                  </a:lnTo>
-                  <a:lnTo>
-                    <a:pt x="768281" y="2080"/>
+                    <a:pt x="256093" y="447499"/>
+                  </a:lnTo>
+                  <a:lnTo>
+                    <a:pt x="512187" y="158291"/>
+                  </a:lnTo>
+                  <a:lnTo>
+                    <a:pt x="768281" y="1785"/>
                   </a:lnTo>
                   <a:lnTo>
                     <a:pt x="1024375" y="0"/>
@@ -5056,23 +5056,23 @@
           <p:spPr>
             <a:xfrm>
               <a:off x="3541460" y="339978"/>
-              <a:ext cx="1024375" cy="901852"/>
+              <a:ext cx="1024375" cy="537356"/>
             </a:xfrm>
             <a:custGeom>
               <a:avLst/>
               <a:pathLst>
-                <a:path w="1024375" h="901852">
+                <a:path w="1024375" h="537356">
                   <a:moveTo>
-                    <a:pt x="0" y="901852"/>
+                    <a:pt x="0" y="536166"/>
                   </a:moveTo>
                   <a:lnTo>
-                    <a:pt x="256093" y="832159"/>
-                  </a:lnTo>
-                  <a:lnTo>
-                    <a:pt x="512187" y="138346"/>
-                  </a:lnTo>
-                  <a:lnTo>
-                    <a:pt x="768281" y="7281"/>
+                    <a:pt x="256093" y="537356"/>
+                  </a:lnTo>
+                  <a:lnTo>
+                    <a:pt x="512187" y="95212"/>
+                  </a:lnTo>
+                  <a:lnTo>
+                    <a:pt x="768281" y="7140"/>
                   </a:lnTo>
                   <a:lnTo>
                     <a:pt x="1024375" y="0"/>
@@ -5104,7 +5104,7 @@
           </p:nvSpPr>
           <p:spPr>
             <a:xfrm>
-              <a:off x="3516634" y="1355352"/>
+              <a:off x="3516634" y="934035"/>
               <a:ext cx="49651" cy="49651"/>
             </a:xfrm>
             <a:prstGeom prst="ellipse">
@@ -5139,7 +5139,7 @@
           </p:nvSpPr>
           <p:spPr>
             <a:xfrm>
-              <a:off x="3516634" y="1157714"/>
+              <a:off x="3516634" y="816209"/>
               <a:ext cx="49651" cy="49651"/>
             </a:xfrm>
             <a:prstGeom prst="ellipse">
@@ -5174,7 +5174,7 @@
           </p:nvSpPr>
           <p:spPr>
             <a:xfrm>
-              <a:off x="3516634" y="1008965"/>
+              <a:off x="3516634" y="727542"/>
               <a:ext cx="49651" cy="49651"/>
             </a:xfrm>
             <a:prstGeom prst="ellipse">
@@ -5209,7 +5209,7 @@
           </p:nvSpPr>
           <p:spPr>
             <a:xfrm>
-              <a:off x="3516634" y="1217005"/>
+              <a:off x="3516634" y="851319"/>
               <a:ext cx="49651" cy="49651"/>
             </a:xfrm>
             <a:prstGeom prst="ellipse">
@@ -5244,7 +5244,7 @@
           </p:nvSpPr>
           <p:spPr>
             <a:xfrm>
-              <a:off x="3772728" y="1057855"/>
+              <a:off x="3772728" y="794786"/>
               <a:ext cx="49651" cy="49651"/>
             </a:xfrm>
             <a:prstGeom prst="ellipse">
@@ -5279,7 +5279,7 @@
           </p:nvSpPr>
           <p:spPr>
             <a:xfrm>
-              <a:off x="3772728" y="934071"/>
+              <a:off x="3772728" y="715046"/>
               <a:ext cx="49651" cy="49651"/>
             </a:xfrm>
             <a:prstGeom prst="ellipse">
@@ -5314,7 +5314,7 @@
           </p:nvSpPr>
           <p:spPr>
             <a:xfrm>
-              <a:off x="3772728" y="1008965"/>
+              <a:off x="3772728" y="762652"/>
               <a:ext cx="49651" cy="49651"/>
             </a:xfrm>
             <a:prstGeom prst="ellipse">
@@ -5349,7 +5349,7 @@
           </p:nvSpPr>
           <p:spPr>
             <a:xfrm>
-              <a:off x="3772728" y="1147312"/>
+              <a:off x="3772728" y="852509"/>
               <a:ext cx="49651" cy="49651"/>
             </a:xfrm>
             <a:prstGeom prst="ellipse">
@@ -5384,7 +5384,7 @@
           </p:nvSpPr>
           <p:spPr>
             <a:xfrm>
-              <a:off x="4028822" y="984000"/>
+              <a:off x="4028822" y="773959"/>
               <a:ext cx="49651" cy="49651"/>
             </a:xfrm>
             <a:prstGeom prst="ellipse">
@@ -5419,7 +5419,7 @@
           </p:nvSpPr>
           <p:spPr>
             <a:xfrm>
-              <a:off x="4028822" y="765559"/>
+              <a:off x="4028822" y="623999"/>
               <a:ext cx="49651" cy="49651"/>
             </a:xfrm>
             <a:prstGeom prst="ellipse">
@@ -5454,7 +5454,7 @@
           </p:nvSpPr>
           <p:spPr>
             <a:xfrm>
-              <a:off x="4028822" y="546076"/>
+              <a:off x="4028822" y="473443"/>
               <a:ext cx="49651" cy="49651"/>
             </a:xfrm>
             <a:prstGeom prst="ellipse">
@@ -5489,7 +5489,7 @@
           </p:nvSpPr>
           <p:spPr>
             <a:xfrm>
-              <a:off x="4028822" y="453499"/>
+              <a:off x="4028822" y="410365"/>
               <a:ext cx="49651" cy="49651"/>
             </a:xfrm>
             <a:prstGeom prst="ellipse">
@@ -5524,7 +5524,7 @@
           </p:nvSpPr>
           <p:spPr>
             <a:xfrm>
-              <a:off x="4284916" y="377564"/>
+              <a:off x="4284916" y="376445"/>
               <a:ext cx="49651" cy="49651"/>
             </a:xfrm>
             <a:prstGeom prst="ellipse">
@@ -5559,7 +5559,7 @@
           </p:nvSpPr>
           <p:spPr>
             <a:xfrm>
-              <a:off x="4284916" y="345318"/>
+              <a:off x="4284916" y="344311"/>
               <a:ext cx="49651" cy="49651"/>
             </a:xfrm>
             <a:prstGeom prst="ellipse">
@@ -5594,7 +5594,7 @@
           </p:nvSpPr>
           <p:spPr>
             <a:xfrm>
-              <a:off x="4284916" y="317233"/>
+              <a:off x="4284916" y="316937"/>
               <a:ext cx="49651" cy="49651"/>
             </a:xfrm>
             <a:prstGeom prst="ellipse">
@@ -5629,7 +5629,7 @@
           </p:nvSpPr>
           <p:spPr>
             <a:xfrm>
-              <a:off x="4284916" y="322434"/>
+              <a:off x="4284916" y="322293"/>
               <a:ext cx="49651" cy="49651"/>
             </a:xfrm>
             <a:prstGeom prst="ellipse">
@@ -5830,7 +5830,7 @@
           </p:nvSpPr>
           <p:spPr>
             <a:xfrm>
-              <a:off x="4789081" y="1380178"/>
+              <a:off x="4789081" y="1232598"/>
               <a:ext cx="1331687" cy="0"/>
             </a:xfrm>
             <a:custGeom>
@@ -5873,7 +5873,7 @@
           </p:nvSpPr>
           <p:spPr>
             <a:xfrm>
-              <a:off x="4789081" y="1120128"/>
+              <a:off x="4789081" y="935058"/>
               <a:ext cx="1331687" cy="0"/>
             </a:xfrm>
             <a:custGeom>
@@ -5916,7 +5916,7 @@
           </p:nvSpPr>
           <p:spPr>
             <a:xfrm>
-              <a:off x="4789081" y="860078"/>
+              <a:off x="4789081" y="637518"/>
               <a:ext cx="1331687" cy="0"/>
             </a:xfrm>
             <a:custGeom>
@@ -5959,7 +5959,7 @@
           </p:nvSpPr>
           <p:spPr>
             <a:xfrm>
-              <a:off x="4789081" y="600028"/>
+              <a:off x="4789081" y="339978"/>
               <a:ext cx="1331687" cy="0"/>
             </a:xfrm>
             <a:custGeom>
@@ -6002,7 +6002,7 @@
           </p:nvSpPr>
           <p:spPr>
             <a:xfrm>
-              <a:off x="4789081" y="339978"/>
+              <a:off x="4789081" y="935058"/>
               <a:ext cx="1331687" cy="0"/>
             </a:xfrm>
             <a:custGeom>
@@ -6023,7 +6023,7 @@
             </a:custGeom>
             <a:ln w="13550" cap="flat">
               <a:solidFill>
-                <a:srgbClr val="BEBEBE">
+                <a:srgbClr val="000000">
                   <a:alpha val="100000"/>
                 </a:srgbClr>
               </a:solidFill>
@@ -6045,27 +6045,27 @@
           </p:nvSpPr>
           <p:spPr>
             <a:xfrm>
-              <a:off x="4942737" y="887123"/>
-              <a:ext cx="1024375" cy="303738"/>
+              <a:off x="4942737" y="828539"/>
+              <a:ext cx="1024375" cy="286233"/>
             </a:xfrm>
             <a:custGeom>
               <a:avLst/>
               <a:pathLst>
-                <a:path w="1024375" h="303738">
+                <a:path w="1024375" h="286233">
                   <a:moveTo>
-                    <a:pt x="0" y="303738"/>
+                    <a:pt x="0" y="17852"/>
                   </a:moveTo>
                   <a:lnTo>
-                    <a:pt x="256093" y="209080"/>
-                  </a:lnTo>
-                  <a:lnTo>
-                    <a:pt x="512187" y="209080"/>
-                  </a:lnTo>
-                  <a:lnTo>
-                    <a:pt x="768281" y="121703"/>
-                  </a:lnTo>
-                  <a:lnTo>
-                    <a:pt x="1024375" y="0"/>
+                    <a:pt x="256093" y="0"/>
+                  </a:lnTo>
+                  <a:lnTo>
+                    <a:pt x="512187" y="30349"/>
+                  </a:lnTo>
+                  <a:lnTo>
+                    <a:pt x="768281" y="163646"/>
+                  </a:lnTo>
+                  <a:lnTo>
+                    <a:pt x="1024375" y="286233"/>
                   </a:lnTo>
                 </a:path>
               </a:pathLst>
@@ -6094,7 +6094,7 @@
           </p:nvSpPr>
           <p:spPr>
             <a:xfrm>
-              <a:off x="4917911" y="1166035"/>
+              <a:off x="4917911" y="821565"/>
               <a:ext cx="49651" cy="49651"/>
             </a:xfrm>
             <a:prstGeom prst="ellipse">
@@ -6129,7 +6129,7 @@
           </p:nvSpPr>
           <p:spPr>
             <a:xfrm>
-              <a:off x="5174005" y="1071377"/>
+              <a:off x="5174005" y="803713"/>
               <a:ext cx="49651" cy="49651"/>
             </a:xfrm>
             <a:prstGeom prst="ellipse">
@@ -6164,7 +6164,7 @@
           </p:nvSpPr>
           <p:spPr>
             <a:xfrm>
-              <a:off x="5430099" y="1071377"/>
+              <a:off x="5430099" y="834062"/>
               <a:ext cx="49651" cy="49651"/>
             </a:xfrm>
             <a:prstGeom prst="ellipse">
@@ -6199,7 +6199,7 @@
           </p:nvSpPr>
           <p:spPr>
             <a:xfrm>
-              <a:off x="5686193" y="984000"/>
+              <a:off x="5686193" y="967360"/>
               <a:ext cx="49651" cy="49651"/>
             </a:xfrm>
             <a:prstGeom prst="ellipse">
@@ -6234,7 +6234,7 @@
           </p:nvSpPr>
           <p:spPr>
             <a:xfrm>
-              <a:off x="5942287" y="862297"/>
+              <a:off x="5942287" y="1089946"/>
               <a:ext cx="49651" cy="49651"/>
             </a:xfrm>
             <a:prstGeom prst="ellipse">
@@ -6295,7 +6295,7 @@
           </p:nvSpPr>
           <p:spPr>
             <a:xfrm>
-              <a:off x="585250" y="2593986"/>
+              <a:off x="585250" y="2446406"/>
               <a:ext cx="1331687" cy="0"/>
             </a:xfrm>
             <a:custGeom>
@@ -6338,7 +6338,7 @@
           </p:nvSpPr>
           <p:spPr>
             <a:xfrm>
-              <a:off x="585250" y="2333936"/>
+              <a:off x="585250" y="2148866"/>
               <a:ext cx="1331687" cy="0"/>
             </a:xfrm>
             <a:custGeom>
@@ -6381,7 +6381,7 @@
           </p:nvSpPr>
           <p:spPr>
             <a:xfrm>
-              <a:off x="585250" y="2073886"/>
+              <a:off x="585250" y="1851326"/>
               <a:ext cx="1331687" cy="0"/>
             </a:xfrm>
             <a:custGeom>
@@ -6424,7 +6424,7 @@
           </p:nvSpPr>
           <p:spPr>
             <a:xfrm>
-              <a:off x="585250" y="1813836"/>
+              <a:off x="585250" y="1553786"/>
               <a:ext cx="1331687" cy="0"/>
             </a:xfrm>
             <a:custGeom>
@@ -6467,7 +6467,7 @@
           </p:nvSpPr>
           <p:spPr>
             <a:xfrm>
-              <a:off x="585250" y="1553786"/>
+              <a:off x="585250" y="2148866"/>
               <a:ext cx="1331687" cy="0"/>
             </a:xfrm>
             <a:custGeom>
@@ -6488,7 +6488,7 @@
             </a:custGeom>
             <a:ln w="13550" cap="flat">
               <a:solidFill>
-                <a:srgbClr val="BEBEBE">
+                <a:srgbClr val="000000">
                   <a:alpha val="100000"/>
                 </a:srgbClr>
               </a:solidFill>
@@ -6510,27 +6510,27 @@
           </p:nvSpPr>
           <p:spPr>
             <a:xfrm>
-              <a:off x="738906" y="1685892"/>
-              <a:ext cx="1024375" cy="730219"/>
+              <a:off x="738906" y="1728740"/>
+              <a:ext cx="1024375" cy="338005"/>
             </a:xfrm>
             <a:custGeom>
               <a:avLst/>
               <a:pathLst>
-                <a:path w="1024375" h="730219">
+                <a:path w="1024375" h="338005">
                   <a:moveTo>
-                    <a:pt x="0" y="730219"/>
+                    <a:pt x="0" y="338005"/>
                   </a:moveTo>
                   <a:lnTo>
-                    <a:pt x="256093" y="502416"/>
-                  </a:lnTo>
-                  <a:lnTo>
-                    <a:pt x="512187" y="433763"/>
-                  </a:lnTo>
-                  <a:lnTo>
-                    <a:pt x="768281" y="47849"/>
-                  </a:lnTo>
-                  <a:lnTo>
-                    <a:pt x="1024375" y="0"/>
+                    <a:pt x="256093" y="234461"/>
+                  </a:lnTo>
+                  <a:lnTo>
+                    <a:pt x="512187" y="213633"/>
+                  </a:lnTo>
+                  <a:lnTo>
+                    <a:pt x="768281" y="0"/>
+                  </a:lnTo>
+                  <a:lnTo>
+                    <a:pt x="1024375" y="12496"/>
                   </a:lnTo>
                 </a:path>
               </a:pathLst>
@@ -6559,27 +6559,27 @@
           </p:nvSpPr>
           <p:spPr>
             <a:xfrm>
-              <a:off x="738906" y="1847123"/>
-              <a:ext cx="1024375" cy="330783"/>
+              <a:off x="738906" y="1895957"/>
+              <a:ext cx="1024375" cy="73194"/>
             </a:xfrm>
             <a:custGeom>
               <a:avLst/>
               <a:pathLst>
-                <a:path w="1024375" h="330783">
+                <a:path w="1024375" h="73194">
                   <a:moveTo>
-                    <a:pt x="0" y="330783"/>
+                    <a:pt x="0" y="29158"/>
                   </a:moveTo>
                   <a:lnTo>
-                    <a:pt x="256093" y="330783"/>
-                  </a:lnTo>
-                  <a:lnTo>
-                    <a:pt x="512187" y="205959"/>
-                  </a:lnTo>
-                  <a:lnTo>
-                    <a:pt x="768281" y="61371"/>
-                  </a:lnTo>
-                  <a:lnTo>
-                    <a:pt x="1024375" y="0"/>
+                    <a:pt x="256093" y="60698"/>
+                  </a:lnTo>
+                  <a:lnTo>
+                    <a:pt x="512187" y="0"/>
+                  </a:lnTo>
+                  <a:lnTo>
+                    <a:pt x="768281" y="3570"/>
+                  </a:lnTo>
+                  <a:lnTo>
+                    <a:pt x="1024375" y="73194"/>
                   </a:lnTo>
                 </a:path>
               </a:pathLst>
@@ -6608,7 +6608,7 @@
           </p:nvSpPr>
           <p:spPr>
             <a:xfrm>
-              <a:off x="714080" y="2153080"/>
+              <a:off x="714080" y="1900290"/>
               <a:ext cx="49651" cy="49651"/>
             </a:xfrm>
             <a:prstGeom prst="ellipse">
@@ -6643,7 +6643,7 @@
           </p:nvSpPr>
           <p:spPr>
             <a:xfrm>
-              <a:off x="714080" y="2391286"/>
+              <a:off x="714080" y="2041919"/>
               <a:ext cx="49651" cy="49651"/>
             </a:xfrm>
             <a:prstGeom prst="ellipse">
@@ -6678,7 +6678,7 @@
           </p:nvSpPr>
           <p:spPr>
             <a:xfrm>
-              <a:off x="970174" y="2153080"/>
+              <a:off x="970174" y="1931830"/>
               <a:ext cx="49651" cy="49651"/>
             </a:xfrm>
             <a:prstGeom prst="ellipse">
@@ -6713,7 +6713,7 @@
           </p:nvSpPr>
           <p:spPr>
             <a:xfrm>
-              <a:off x="970174" y="2163482"/>
+              <a:off x="970174" y="1938375"/>
               <a:ext cx="49651" cy="49651"/>
             </a:xfrm>
             <a:prstGeom prst="ellipse">
@@ -6748,7 +6748,7 @@
           </p:nvSpPr>
           <p:spPr>
             <a:xfrm>
-              <a:off x="1226268" y="2028256"/>
+              <a:off x="1226268" y="1871131"/>
               <a:ext cx="49651" cy="49651"/>
             </a:xfrm>
             <a:prstGeom prst="ellipse">
@@ -6783,7 +6783,7 @@
           </p:nvSpPr>
           <p:spPr>
             <a:xfrm>
-              <a:off x="1226268" y="2094829"/>
+              <a:off x="1226268" y="1917548"/>
               <a:ext cx="49651" cy="49651"/>
             </a:xfrm>
             <a:prstGeom prst="ellipse">
@@ -6818,7 +6818,7 @@
           </p:nvSpPr>
           <p:spPr>
             <a:xfrm>
-              <a:off x="1482362" y="1883669"/>
+              <a:off x="1482362" y="1874702"/>
               <a:ext cx="49651" cy="49651"/>
             </a:xfrm>
             <a:prstGeom prst="ellipse">
@@ -6853,7 +6853,7 @@
           </p:nvSpPr>
           <p:spPr>
             <a:xfrm>
-              <a:off x="1482362" y="1708915"/>
+              <a:off x="1482362" y="1703914"/>
               <a:ext cx="49651" cy="49651"/>
             </a:xfrm>
             <a:prstGeom prst="ellipse">
@@ -6888,7 +6888,7 @@
           </p:nvSpPr>
           <p:spPr>
             <a:xfrm>
-              <a:off x="1738456" y="1822297"/>
+              <a:off x="1738456" y="1944326"/>
               <a:ext cx="49651" cy="49651"/>
             </a:xfrm>
             <a:prstGeom prst="ellipse">
@@ -6923,7 +6923,7 @@
           </p:nvSpPr>
           <p:spPr>
             <a:xfrm>
-              <a:off x="1738456" y="1661066"/>
+              <a:off x="1738456" y="1716411"/>
               <a:ext cx="49651" cy="49651"/>
             </a:xfrm>
             <a:prstGeom prst="ellipse">
@@ -6984,7 +6984,7 @@
           </p:nvSpPr>
           <p:spPr>
             <a:xfrm>
-              <a:off x="1986527" y="2593986"/>
+              <a:off x="1986527" y="2446406"/>
               <a:ext cx="1331687" cy="0"/>
             </a:xfrm>
             <a:custGeom>
@@ -7027,7 +7027,7 @@
           </p:nvSpPr>
           <p:spPr>
             <a:xfrm>
-              <a:off x="1986527" y="2333936"/>
+              <a:off x="1986527" y="2148866"/>
               <a:ext cx="1331687" cy="0"/>
             </a:xfrm>
             <a:custGeom>
@@ -7070,7 +7070,7 @@
           </p:nvSpPr>
           <p:spPr>
             <a:xfrm>
-              <a:off x="1986527" y="2073886"/>
+              <a:off x="1986527" y="1851326"/>
               <a:ext cx="1331687" cy="0"/>
             </a:xfrm>
             <a:custGeom>
@@ -7113,7 +7113,7 @@
           </p:nvSpPr>
           <p:spPr>
             <a:xfrm>
-              <a:off x="1986527" y="1813836"/>
+              <a:off x="1986527" y="1553786"/>
               <a:ext cx="1331687" cy="0"/>
             </a:xfrm>
             <a:custGeom>
@@ -7156,7 +7156,7 @@
           </p:nvSpPr>
           <p:spPr>
             <a:xfrm>
-              <a:off x="1986527" y="1553786"/>
+              <a:off x="1986527" y="2148866"/>
               <a:ext cx="1331687" cy="0"/>
             </a:xfrm>
             <a:custGeom>
@@ -7177,7 +7177,7 @@
             </a:custGeom>
             <a:ln w="13550" cap="flat">
               <a:solidFill>
-                <a:srgbClr val="BEBEBE">
+                <a:srgbClr val="000000">
                   <a:alpha val="100000"/>
                 </a:srgbClr>
               </a:solidFill>
@@ -7199,24 +7199,24 @@
           </p:nvSpPr>
           <p:spPr>
             <a:xfrm>
-              <a:off x="2140183" y="1719178"/>
-              <a:ext cx="1024375" cy="874807"/>
+              <a:off x="2140183" y="1787653"/>
+              <a:ext cx="1024375" cy="479634"/>
             </a:xfrm>
             <a:custGeom>
               <a:avLst/>
               <a:pathLst>
-                <a:path w="1024375" h="874807">
+                <a:path w="1024375" h="479634">
                   <a:moveTo>
-                    <a:pt x="0" y="874807"/>
+                    <a:pt x="0" y="385016"/>
                   </a:moveTo>
                   <a:lnTo>
-                    <a:pt x="256093" y="874807"/>
-                  </a:lnTo>
-                  <a:lnTo>
-                    <a:pt x="512187" y="874807"/>
-                  </a:lnTo>
-                  <a:lnTo>
-                    <a:pt x="768281" y="172673"/>
+                    <a:pt x="256093" y="437978"/>
+                  </a:lnTo>
+                  <a:lnTo>
+                    <a:pt x="512187" y="479634"/>
+                  </a:lnTo>
+                  <a:lnTo>
+                    <a:pt x="768281" y="95807"/>
                   </a:lnTo>
                   <a:lnTo>
                     <a:pt x="1024375" y="0"/>
@@ -7248,7 +7248,7 @@
           </p:nvSpPr>
           <p:spPr>
             <a:xfrm>
-              <a:off x="2115357" y="2569160"/>
+              <a:off x="2115357" y="2147843"/>
               <a:ext cx="49651" cy="49651"/>
             </a:xfrm>
             <a:prstGeom prst="ellipse">
@@ -7283,7 +7283,7 @@
           </p:nvSpPr>
           <p:spPr>
             <a:xfrm>
-              <a:off x="2371451" y="2569160"/>
+              <a:off x="2371451" y="2200806"/>
               <a:ext cx="49651" cy="49651"/>
             </a:xfrm>
             <a:prstGeom prst="ellipse">
@@ -7318,7 +7318,7 @@
           </p:nvSpPr>
           <p:spPr>
             <a:xfrm>
-              <a:off x="2627545" y="2569160"/>
+              <a:off x="2627545" y="2242461"/>
               <a:ext cx="49651" cy="49651"/>
             </a:xfrm>
             <a:prstGeom prst="ellipse">
@@ -7353,7 +7353,7 @@
           </p:nvSpPr>
           <p:spPr>
             <a:xfrm>
-              <a:off x="2883639" y="1867025"/>
+              <a:off x="2883639" y="1858635"/>
               <a:ext cx="49651" cy="49651"/>
             </a:xfrm>
             <a:prstGeom prst="ellipse">
@@ -7388,7 +7388,7 @@
           </p:nvSpPr>
           <p:spPr>
             <a:xfrm>
-              <a:off x="3139733" y="1694352"/>
+              <a:off x="3139733" y="1762827"/>
               <a:ext cx="49651" cy="49651"/>
             </a:xfrm>
             <a:prstGeom prst="ellipse">
@@ -7449,7 +7449,7 @@
           </p:nvSpPr>
           <p:spPr>
             <a:xfrm>
-              <a:off x="3387804" y="2593986"/>
+              <a:off x="3387804" y="2446406"/>
               <a:ext cx="1331687" cy="0"/>
             </a:xfrm>
             <a:custGeom>
@@ -7492,7 +7492,7 @@
           </p:nvSpPr>
           <p:spPr>
             <a:xfrm>
-              <a:off x="3387804" y="2333936"/>
+              <a:off x="3387804" y="2148866"/>
               <a:ext cx="1331687" cy="0"/>
             </a:xfrm>
             <a:custGeom>
@@ -7535,7 +7535,7 @@
           </p:nvSpPr>
           <p:spPr>
             <a:xfrm>
-              <a:off x="3387804" y="2073886"/>
+              <a:off x="3387804" y="1851326"/>
               <a:ext cx="1331687" cy="0"/>
             </a:xfrm>
             <a:custGeom>
@@ -7578,7 +7578,7 @@
           </p:nvSpPr>
           <p:spPr>
             <a:xfrm>
-              <a:off x="3387804" y="1813836"/>
+              <a:off x="3387804" y="1553786"/>
               <a:ext cx="1331687" cy="0"/>
             </a:xfrm>
             <a:custGeom>
@@ -7621,7 +7621,7 @@
           </p:nvSpPr>
           <p:spPr>
             <a:xfrm>
-              <a:off x="3387804" y="1553786"/>
+              <a:off x="3387804" y="2148866"/>
               <a:ext cx="1331687" cy="0"/>
             </a:xfrm>
             <a:custGeom>
@@ -7642,7 +7642,7 @@
             </a:custGeom>
             <a:ln w="13550" cap="flat">
               <a:solidFill>
-                <a:srgbClr val="BEBEBE">
+                <a:srgbClr val="000000">
                   <a:alpha val="100000"/>
                 </a:srgbClr>
               </a:solidFill>
@@ -7664,24 +7664,24 @@
           </p:nvSpPr>
           <p:spPr>
             <a:xfrm>
-              <a:off x="3541460" y="1653646"/>
-              <a:ext cx="1024375" cy="726059"/>
+              <a:off x="3541460" y="1694820"/>
+              <a:ext cx="1024375" cy="349906"/>
             </a:xfrm>
             <a:custGeom>
               <a:avLst/>
               <a:pathLst>
-                <a:path w="1024375" h="726059">
+                <a:path w="1024375" h="349906">
                   <a:moveTo>
-                    <a:pt x="0" y="726059"/>
+                    <a:pt x="0" y="349906"/>
                   </a:moveTo>
                   <a:lnTo>
-                    <a:pt x="256093" y="560667"/>
-                  </a:lnTo>
-                  <a:lnTo>
-                    <a:pt x="512187" y="523220"/>
-                  </a:lnTo>
-                  <a:lnTo>
-                    <a:pt x="768281" y="75934"/>
+                    <a:pt x="256093" y="285638"/>
+                  </a:lnTo>
+                  <a:lnTo>
+                    <a:pt x="512187" y="286233"/>
+                  </a:lnTo>
+                  <a:lnTo>
+                    <a:pt x="768281" y="30944"/>
                   </a:lnTo>
                   <a:lnTo>
                     <a:pt x="1024375" y="0"/>
@@ -7713,24 +7713,24 @@
           </p:nvSpPr>
           <p:spPr>
             <a:xfrm>
-              <a:off x="3541460" y="1665088"/>
-              <a:ext cx="1024375" cy="653245"/>
+              <a:off x="3541460" y="1710888"/>
+              <a:ext cx="1024375" cy="298134"/>
             </a:xfrm>
             <a:custGeom>
               <a:avLst/>
               <a:pathLst>
-                <a:path w="1024375" h="653245">
+                <a:path w="1024375" h="298134">
                   <a:moveTo>
-                    <a:pt x="0" y="653245"/>
+                    <a:pt x="0" y="298134"/>
                   </a:moveTo>
                   <a:lnTo>
-                    <a:pt x="256093" y="438964"/>
-                  </a:lnTo>
-                  <a:lnTo>
-                    <a:pt x="512187" y="438964"/>
-                  </a:lnTo>
-                  <a:lnTo>
-                    <a:pt x="768281" y="90497"/>
+                    <a:pt x="256093" y="198756"/>
+                  </a:lnTo>
+                  <a:lnTo>
+                    <a:pt x="512187" y="220774"/>
+                  </a:lnTo>
+                  <a:lnTo>
+                    <a:pt x="768281" y="39870"/>
                   </a:lnTo>
                   <a:lnTo>
                     <a:pt x="1024375" y="0"/>
@@ -7762,27 +7762,27 @@
           </p:nvSpPr>
           <p:spPr>
             <a:xfrm>
-              <a:off x="3541460" y="1709816"/>
-              <a:ext cx="1024375" cy="884169"/>
+              <a:off x="3541460" y="1752543"/>
+              <a:ext cx="1024375" cy="420126"/>
             </a:xfrm>
             <a:custGeom>
               <a:avLst/>
               <a:pathLst>
-                <a:path w="1024375" h="884169">
+                <a:path w="1024375" h="420126">
                   <a:moveTo>
-                    <a:pt x="0" y="884169"/>
+                    <a:pt x="0" y="420126"/>
                   </a:moveTo>
                   <a:lnTo>
-                    <a:pt x="256093" y="586672"/>
-                  </a:lnTo>
-                  <a:lnTo>
-                    <a:pt x="512187" y="383833"/>
-                  </a:lnTo>
-                  <a:lnTo>
-                    <a:pt x="768281" y="47849"/>
-                  </a:lnTo>
-                  <a:lnTo>
-                    <a:pt x="1024375" y="0"/>
+                    <a:pt x="256093" y="280877"/>
+                  </a:lnTo>
+                  <a:lnTo>
+                    <a:pt x="512187" y="171978"/>
+                  </a:lnTo>
+                  <a:lnTo>
+                    <a:pt x="768281" y="0"/>
+                  </a:lnTo>
+                  <a:lnTo>
+                    <a:pt x="1024375" y="22613"/>
                   </a:lnTo>
                 </a:path>
               </a:pathLst>
@@ -7811,7 +7811,7 @@
           </p:nvSpPr>
           <p:spPr>
             <a:xfrm>
-              <a:off x="3516634" y="2569160"/>
+              <a:off x="3516634" y="2147843"/>
               <a:ext cx="49651" cy="49651"/>
             </a:xfrm>
             <a:prstGeom prst="ellipse">
@@ -7846,7 +7846,7 @@
           </p:nvSpPr>
           <p:spPr>
             <a:xfrm>
-              <a:off x="3516634" y="2354879"/>
+              <a:off x="3516634" y="2019901"/>
               <a:ext cx="49651" cy="49651"/>
             </a:xfrm>
             <a:prstGeom prst="ellipse">
@@ -7881,7 +7881,7 @@
           </p:nvSpPr>
           <p:spPr>
             <a:xfrm>
-              <a:off x="3516634" y="2293507"/>
+              <a:off x="3516634" y="1984197"/>
               <a:ext cx="49651" cy="49651"/>
             </a:xfrm>
             <a:prstGeom prst="ellipse">
@@ -7916,7 +7916,7 @@
           </p:nvSpPr>
           <p:spPr>
             <a:xfrm>
-              <a:off x="3772728" y="2271663"/>
+              <a:off x="3772728" y="2008595"/>
               <a:ext cx="49651" cy="49651"/>
             </a:xfrm>
             <a:prstGeom prst="ellipse">
@@ -7951,7 +7951,7 @@
           </p:nvSpPr>
           <p:spPr>
             <a:xfrm>
-              <a:off x="3772728" y="2189487"/>
+              <a:off x="3772728" y="1955633"/>
               <a:ext cx="49651" cy="49651"/>
             </a:xfrm>
             <a:prstGeom prst="ellipse">
@@ -7986,7 +7986,7 @@
           </p:nvSpPr>
           <p:spPr>
             <a:xfrm>
-              <a:off x="3772728" y="2079226"/>
+              <a:off x="3772728" y="1884818"/>
               <a:ext cx="49651" cy="49651"/>
             </a:xfrm>
             <a:prstGeom prst="ellipse">
@@ -8021,7 +8021,7 @@
           </p:nvSpPr>
           <p:spPr>
             <a:xfrm>
-              <a:off x="4028822" y="2068824"/>
+              <a:off x="4028822" y="1899695"/>
               <a:ext cx="49651" cy="49651"/>
             </a:xfrm>
             <a:prstGeom prst="ellipse">
@@ -8056,7 +8056,7 @@
           </p:nvSpPr>
           <p:spPr>
             <a:xfrm>
-              <a:off x="4028822" y="2152040"/>
+              <a:off x="4028822" y="1956228"/>
               <a:ext cx="49651" cy="49651"/>
             </a:xfrm>
             <a:prstGeom prst="ellipse">
@@ -8091,7 +8091,7 @@
           </p:nvSpPr>
           <p:spPr>
             <a:xfrm>
-              <a:off x="4028822" y="2079226"/>
+              <a:off x="4028822" y="1906836"/>
               <a:ext cx="49651" cy="49651"/>
             </a:xfrm>
             <a:prstGeom prst="ellipse">
@@ -8126,7 +8126,7 @@
           </p:nvSpPr>
           <p:spPr>
             <a:xfrm>
-              <a:off x="4284916" y="1732840"/>
+              <a:off x="4284916" y="1727717"/>
               <a:ext cx="49651" cy="49651"/>
             </a:xfrm>
             <a:prstGeom prst="ellipse">
@@ -8161,7 +8161,7 @@
           </p:nvSpPr>
           <p:spPr>
             <a:xfrm>
-              <a:off x="4284916" y="1704754"/>
+              <a:off x="4284916" y="1700939"/>
               <a:ext cx="49651" cy="49651"/>
             </a:xfrm>
             <a:prstGeom prst="ellipse">
@@ -8196,7 +8196,7 @@
           </p:nvSpPr>
           <p:spPr>
             <a:xfrm>
-              <a:off x="4284916" y="1730759"/>
+              <a:off x="4284916" y="1725932"/>
               <a:ext cx="49651" cy="49651"/>
             </a:xfrm>
             <a:prstGeom prst="ellipse">
@@ -8231,7 +8231,7 @@
           </p:nvSpPr>
           <p:spPr>
             <a:xfrm>
-              <a:off x="4541010" y="1684990"/>
+              <a:off x="4541010" y="1750330"/>
               <a:ext cx="49651" cy="49651"/>
             </a:xfrm>
             <a:prstGeom prst="ellipse">
@@ -8266,7 +8266,7 @@
           </p:nvSpPr>
           <p:spPr>
             <a:xfrm>
-              <a:off x="4541010" y="1628820"/>
+              <a:off x="4541010" y="1669994"/>
               <a:ext cx="49651" cy="49651"/>
             </a:xfrm>
             <a:prstGeom prst="ellipse">
@@ -8301,7 +8301,7 @@
           </p:nvSpPr>
           <p:spPr>
             <a:xfrm>
-              <a:off x="4541010" y="1640262"/>
+              <a:off x="4541010" y="1686062"/>
               <a:ext cx="49651" cy="49651"/>
             </a:xfrm>
             <a:prstGeom prst="ellipse">
@@ -8362,7 +8362,7 @@
           </p:nvSpPr>
           <p:spPr>
             <a:xfrm>
-              <a:off x="4789081" y="2593986"/>
+              <a:off x="4789081" y="2446406"/>
               <a:ext cx="1331687" cy="0"/>
             </a:xfrm>
             <a:custGeom>
@@ -8405,7 +8405,7 @@
           </p:nvSpPr>
           <p:spPr>
             <a:xfrm>
-              <a:off x="4789081" y="2333936"/>
+              <a:off x="4789081" y="2148866"/>
               <a:ext cx="1331687" cy="0"/>
             </a:xfrm>
             <a:custGeom>
@@ -8448,7 +8448,7 @@
           </p:nvSpPr>
           <p:spPr>
             <a:xfrm>
-              <a:off x="4789081" y="2073886"/>
+              <a:off x="4789081" y="1851326"/>
               <a:ext cx="1331687" cy="0"/>
             </a:xfrm>
             <a:custGeom>
@@ -8491,7 +8491,7 @@
           </p:nvSpPr>
           <p:spPr>
             <a:xfrm>
-              <a:off x="4789081" y="1813836"/>
+              <a:off x="4789081" y="1553786"/>
               <a:ext cx="1331687" cy="0"/>
             </a:xfrm>
             <a:custGeom>
@@ -8534,7 +8534,7 @@
           </p:nvSpPr>
           <p:spPr>
             <a:xfrm>
-              <a:off x="4789081" y="1553786"/>
+              <a:off x="4789081" y="2148866"/>
               <a:ext cx="1331687" cy="0"/>
             </a:xfrm>
             <a:custGeom>
@@ -8555,7 +8555,7 @@
             </a:custGeom>
             <a:ln w="13550" cap="flat">
               <a:solidFill>
-                <a:srgbClr val="BEBEBE">
+                <a:srgbClr val="000000">
                   <a:alpha val="100000"/>
                 </a:srgbClr>
               </a:solidFill>
@@ -8577,15 +8577,15 @@
           </p:nvSpPr>
           <p:spPr>
             <a:xfrm>
-              <a:off x="4942737" y="1608917"/>
-              <a:ext cx="256093" cy="54090"/>
+              <a:off x="4942737" y="1588896"/>
+              <a:ext cx="256093" cy="29753"/>
             </a:xfrm>
             <a:custGeom>
               <a:avLst/>
               <a:pathLst>
-                <a:path w="256093" h="54090">
+                <a:path w="256093" h="29753">
                   <a:moveTo>
-                    <a:pt x="0" y="54090"/>
+                    <a:pt x="0" y="29753"/>
                   </a:moveTo>
                   <a:lnTo>
                     <a:pt x="256093" y="0"/>
@@ -8617,27 +8617,27 @@
           </p:nvSpPr>
           <p:spPr>
             <a:xfrm>
-              <a:off x="4942737" y="1830480"/>
-              <a:ext cx="1024375" cy="503456"/>
+              <a:off x="4942737" y="1914405"/>
+              <a:ext cx="1024375" cy="174358"/>
             </a:xfrm>
             <a:custGeom>
               <a:avLst/>
               <a:pathLst>
-                <a:path w="1024375" h="503456">
+                <a:path w="1024375" h="174358">
                   <a:moveTo>
-                    <a:pt x="0" y="503456"/>
+                    <a:pt x="0" y="103543"/>
                   </a:moveTo>
                   <a:lnTo>
-                    <a:pt x="256093" y="503456"/>
-                  </a:lnTo>
-                  <a:lnTo>
-                    <a:pt x="512187" y="503456"/>
-                  </a:lnTo>
-                  <a:lnTo>
-                    <a:pt x="768281" y="93617"/>
-                  </a:lnTo>
-                  <a:lnTo>
-                    <a:pt x="1024375" y="0"/>
+                    <a:pt x="256093" y="143414"/>
+                  </a:lnTo>
+                  <a:lnTo>
+                    <a:pt x="512187" y="174358"/>
+                  </a:lnTo>
+                  <a:lnTo>
+                    <a:pt x="768281" y="0"/>
+                  </a:lnTo>
+                  <a:lnTo>
+                    <a:pt x="1024375" y="30349"/>
                   </a:lnTo>
                 </a:path>
               </a:pathLst>
@@ -8667,14 +8667,14 @@
           <p:spPr>
             <a:xfrm>
               <a:off x="4942737" y="1553786"/>
-              <a:ext cx="256093" cy="43688"/>
+              <a:ext cx="256093" cy="25588"/>
             </a:xfrm>
             <a:custGeom>
               <a:avLst/>
               <a:pathLst>
-                <a:path w="256093" h="43688">
+                <a:path w="256093" h="25588">
                   <a:moveTo>
-                    <a:pt x="0" y="43688"/>
+                    <a:pt x="0" y="25588"/>
                   </a:moveTo>
                   <a:lnTo>
                     <a:pt x="256093" y="0"/>
@@ -8706,7 +8706,7 @@
           </p:nvSpPr>
           <p:spPr>
             <a:xfrm>
-              <a:off x="4917911" y="2309110"/>
+              <a:off x="4917911" y="1993123"/>
               <a:ext cx="49651" cy="49651"/>
             </a:xfrm>
             <a:prstGeom prst="ellipse">
@@ -8741,7 +8741,7 @@
           </p:nvSpPr>
           <p:spPr>
             <a:xfrm>
-              <a:off x="4917911" y="1572649"/>
+              <a:off x="4917911" y="1554549"/>
               <a:ext cx="49651" cy="49651"/>
             </a:xfrm>
             <a:prstGeom prst="ellipse">
@@ -8776,7 +8776,7 @@
           </p:nvSpPr>
           <p:spPr>
             <a:xfrm>
-              <a:off x="4917911" y="1638181"/>
+              <a:off x="4917911" y="1593824"/>
               <a:ext cx="49651" cy="49651"/>
             </a:xfrm>
             <a:prstGeom prst="ellipse">
@@ -8811,7 +8811,7 @@
           </p:nvSpPr>
           <p:spPr>
             <a:xfrm>
-              <a:off x="5174005" y="2309110"/>
+              <a:off x="5174005" y="2032993"/>
               <a:ext cx="49651" cy="49651"/>
             </a:xfrm>
             <a:prstGeom prst="ellipse">
@@ -8881,7 +8881,7 @@
           </p:nvSpPr>
           <p:spPr>
             <a:xfrm>
-              <a:off x="5174005" y="1584091"/>
+              <a:off x="5174005" y="1564070"/>
               <a:ext cx="49651" cy="49651"/>
             </a:xfrm>
             <a:prstGeom prst="ellipse">
@@ -8916,7 +8916,7 @@
           </p:nvSpPr>
           <p:spPr>
             <a:xfrm>
-              <a:off x="5430099" y="2309110"/>
+              <a:off x="5430099" y="2063937"/>
               <a:ext cx="49651" cy="49651"/>
             </a:xfrm>
             <a:prstGeom prst="ellipse">
@@ -8951,7 +8951,7 @@
           </p:nvSpPr>
           <p:spPr>
             <a:xfrm>
-              <a:off x="5686193" y="1899272"/>
+              <a:off x="5686193" y="1889579"/>
               <a:ext cx="49651" cy="49651"/>
             </a:xfrm>
             <a:prstGeom prst="ellipse">
@@ -8986,7 +8986,7 @@
           </p:nvSpPr>
           <p:spPr>
             <a:xfrm>
-              <a:off x="5942287" y="1805654"/>
+              <a:off x="5942287" y="1919928"/>
               <a:ext cx="49651" cy="49651"/>
             </a:xfrm>
             <a:prstGeom prst="ellipse">
@@ -11427,7 +11427,53 @@
           </p:nvSpPr>
           <p:spPr>
             <a:xfrm>
-              <a:off x="360100" y="1334636"/>
+              <a:off x="258539" y="1187056"/>
+              <a:ext cx="264080" cy="85903"/>
+            </a:xfrm>
+            <a:prstGeom prst="rect">
+              <a:avLst/>
+            </a:prstGeom>
+            <a:noFill/>
+          </p:spPr>
+          <p:txBody>
+            <a:bodyPr lIns="0" rIns="0" tIns="0" bIns="0" anchorCtr="1" anchor="ctr" wrap="none"/>
+            <a:lstStyle/>
+            <a:p>
+              <a:pPr algn="l" marL="0" marR="0" indent="0">
+                <a:lnSpc>
+                  <a:spcPts val="960"/>
+                </a:lnSpc>
+                <a:spcBef>
+                  <a:spcPts val="0"/>
+                </a:spcBef>
+                <a:spcAft>
+                  <a:spcPts val="0"/>
+                </a:spcAft>
+              </a:pPr>
+              <a:r>
+                <a:rPr sz="960">
+                  <a:solidFill>
+                    <a:srgbClr val="4D4D4D">
+                      <a:alpha val="100000"/>
+                    </a:srgbClr>
+                  </a:solidFill>
+                  <a:latin typeface="Times New Roman"/>
+                  <a:cs typeface="Times New Roman"/>
+                </a:rPr>
+                <a:t>-50%</a:t>
+              </a:r>
+            </a:p>
+          </p:txBody>
+        </p:sp>
+        <p:sp>
+          <p:nvSpPr>
+            <p:cNvPr id="219" name="tx219"/>
+            <p:cNvSpPr/>
+            <p:nvPr/>
+          </p:nvSpPr>
+          <p:spPr>
+            <a:xfrm>
+              <a:off x="360100" y="889516"/>
               <a:ext cx="162520" cy="85903"/>
             </a:xfrm>
             <a:prstGeom prst="rect">
@@ -11467,59 +11513,13 @@
         </p:sp>
         <p:sp>
           <p:nvSpPr>
-            <p:cNvPr id="219" name="tx219"/>
-            <p:cNvSpPr/>
-            <p:nvPr/>
-          </p:nvSpPr>
-          <p:spPr>
-            <a:xfrm>
-              <a:off x="299140" y="1074586"/>
-              <a:ext cx="223480" cy="85903"/>
-            </a:xfrm>
-            <a:prstGeom prst="rect">
-              <a:avLst/>
-            </a:prstGeom>
-            <a:noFill/>
-          </p:spPr>
-          <p:txBody>
-            <a:bodyPr lIns="0" rIns="0" tIns="0" bIns="0" anchorCtr="1" anchor="ctr" wrap="none"/>
-            <a:lstStyle/>
-            <a:p>
-              <a:pPr algn="l" marL="0" marR="0" indent="0">
-                <a:lnSpc>
-                  <a:spcPts val="960"/>
-                </a:lnSpc>
-                <a:spcBef>
-                  <a:spcPts val="0"/>
-                </a:spcBef>
-                <a:spcAft>
-                  <a:spcPts val="0"/>
-                </a:spcAft>
-              </a:pPr>
-              <a:r>
-                <a:rPr sz="960">
-                  <a:solidFill>
-                    <a:srgbClr val="4D4D4D">
-                      <a:alpha val="100000"/>
-                    </a:srgbClr>
-                  </a:solidFill>
-                  <a:latin typeface="Times New Roman"/>
-                  <a:cs typeface="Times New Roman"/>
-                </a:rPr>
-                <a:t>25%</a:t>
-              </a:r>
-            </a:p>
-          </p:txBody>
-        </p:sp>
-        <p:sp>
-          <p:nvSpPr>
             <p:cNvPr id="220" name="tx220"/>
             <p:cNvSpPr/>
             <p:nvPr/>
           </p:nvSpPr>
           <p:spPr>
             <a:xfrm>
-              <a:off x="299140" y="814536"/>
+              <a:off x="299140" y="591977"/>
               <a:ext cx="223480" cy="85903"/>
             </a:xfrm>
             <a:prstGeom prst="rect">
@@ -11565,52 +11565,6 @@
           </p:nvSpPr>
           <p:spPr>
             <a:xfrm>
-              <a:off x="299140" y="554487"/>
-              <a:ext cx="223480" cy="85903"/>
-            </a:xfrm>
-            <a:prstGeom prst="rect">
-              <a:avLst/>
-            </a:prstGeom>
-            <a:noFill/>
-          </p:spPr>
-          <p:txBody>
-            <a:bodyPr lIns="0" rIns="0" tIns="0" bIns="0" anchorCtr="1" anchor="ctr" wrap="none"/>
-            <a:lstStyle/>
-            <a:p>
-              <a:pPr algn="l" marL="0" marR="0" indent="0">
-                <a:lnSpc>
-                  <a:spcPts val="960"/>
-                </a:lnSpc>
-                <a:spcBef>
-                  <a:spcPts val="0"/>
-                </a:spcBef>
-                <a:spcAft>
-                  <a:spcPts val="0"/>
-                </a:spcAft>
-              </a:pPr>
-              <a:r>
-                <a:rPr sz="960">
-                  <a:solidFill>
-                    <a:srgbClr val="4D4D4D">
-                      <a:alpha val="100000"/>
-                    </a:srgbClr>
-                  </a:solidFill>
-                  <a:latin typeface="Times New Roman"/>
-                  <a:cs typeface="Times New Roman"/>
-                </a:rPr>
-                <a:t>75%</a:t>
-              </a:r>
-            </a:p>
-          </p:txBody>
-        </p:sp>
-        <p:sp>
-          <p:nvSpPr>
-            <p:cNvPr id="222" name="tx222"/>
-            <p:cNvSpPr/>
-            <p:nvPr/>
-          </p:nvSpPr>
-          <p:spPr>
-            <a:xfrm>
               <a:off x="238180" y="294437"/>
               <a:ext cx="284440" cy="85903"/>
             </a:xfrm>
@@ -11651,13 +11605,13 @@
         </p:sp>
         <p:sp>
           <p:nvSpPr>
-            <p:cNvPr id="223" name="pl223"/>
-            <p:cNvSpPr/>
-            <p:nvPr/>
-          </p:nvSpPr>
-          <p:spPr>
-            <a:xfrm>
-              <a:off x="550455" y="1380178"/>
+            <p:cNvPr id="222" name="pl222"/>
+            <p:cNvSpPr/>
+            <p:nvPr/>
+          </p:nvSpPr>
+          <p:spPr>
+            <a:xfrm>
+              <a:off x="550455" y="1232598"/>
               <a:ext cx="34794" cy="0"/>
             </a:xfrm>
             <a:custGeom>
@@ -11691,13 +11645,13 @@
         </p:sp>
         <p:sp>
           <p:nvSpPr>
-            <p:cNvPr id="224" name="pl224"/>
-            <p:cNvSpPr/>
-            <p:nvPr/>
-          </p:nvSpPr>
-          <p:spPr>
-            <a:xfrm>
-              <a:off x="550455" y="1120128"/>
+            <p:cNvPr id="223" name="pl223"/>
+            <p:cNvSpPr/>
+            <p:nvPr/>
+          </p:nvSpPr>
+          <p:spPr>
+            <a:xfrm>
+              <a:off x="550455" y="935058"/>
               <a:ext cx="34794" cy="0"/>
             </a:xfrm>
             <a:custGeom>
@@ -11731,13 +11685,13 @@
         </p:sp>
         <p:sp>
           <p:nvSpPr>
-            <p:cNvPr id="225" name="pl225"/>
-            <p:cNvSpPr/>
-            <p:nvPr/>
-          </p:nvSpPr>
-          <p:spPr>
-            <a:xfrm>
-              <a:off x="550455" y="860078"/>
+            <p:cNvPr id="224" name="pl224"/>
+            <p:cNvSpPr/>
+            <p:nvPr/>
+          </p:nvSpPr>
+          <p:spPr>
+            <a:xfrm>
+              <a:off x="550455" y="637518"/>
               <a:ext cx="34794" cy="0"/>
             </a:xfrm>
             <a:custGeom>
@@ -11771,13 +11725,13 @@
         </p:sp>
         <p:sp>
           <p:nvSpPr>
-            <p:cNvPr id="226" name="pl226"/>
-            <p:cNvSpPr/>
-            <p:nvPr/>
-          </p:nvSpPr>
-          <p:spPr>
-            <a:xfrm>
-              <a:off x="550455" y="600028"/>
+            <p:cNvPr id="225" name="pl225"/>
+            <p:cNvSpPr/>
+            <p:nvPr/>
+          </p:nvSpPr>
+          <p:spPr>
+            <a:xfrm>
+              <a:off x="550455" y="339978"/>
               <a:ext cx="34794" cy="0"/>
             </a:xfrm>
             <a:custGeom>
@@ -11811,47 +11765,7 @@
         </p:sp>
         <p:sp>
           <p:nvSpPr>
-            <p:cNvPr id="227" name="pl227"/>
-            <p:cNvSpPr/>
-            <p:nvPr/>
-          </p:nvSpPr>
-          <p:spPr>
-            <a:xfrm>
-              <a:off x="550455" y="339978"/>
-              <a:ext cx="34794" cy="0"/>
-            </a:xfrm>
-            <a:custGeom>
-              <a:avLst/>
-              <a:pathLst>
-                <a:path w="34794" h="0">
-                  <a:moveTo>
-                    <a:pt x="0" y="0"/>
-                  </a:moveTo>
-                  <a:lnTo>
-                    <a:pt x="34794" y="0"/>
-                  </a:lnTo>
-                </a:path>
-              </a:pathLst>
-            </a:custGeom>
-            <a:ln w="13550" cap="flat">
-              <a:solidFill>
-                <a:srgbClr val="333333">
-                  <a:alpha val="100000"/>
-                </a:srgbClr>
-              </a:solidFill>
-              <a:prstDash val="solid"/>
-              <a:round/>
-            </a:ln>
-          </p:spPr>
-          <p:txBody>
-            <a:bodyPr/>
-            <a:lstStyle/>
-            <a:p/>
-          </p:txBody>
-        </p:sp>
-        <p:sp>
-          <p:nvSpPr>
-            <p:cNvPr id="228" name="pl228"/>
+            <p:cNvPr id="226" name="pl226"/>
             <p:cNvSpPr/>
             <p:nvPr/>
           </p:nvSpPr>
@@ -11891,13 +11805,59 @@
         </p:sp>
         <p:sp>
           <p:nvSpPr>
-            <p:cNvPr id="229" name="tx229"/>
-            <p:cNvSpPr/>
-            <p:nvPr/>
-          </p:nvSpPr>
-          <p:spPr>
-            <a:xfrm>
-              <a:off x="360100" y="2548444"/>
+            <p:cNvPr id="227" name="tx227"/>
+            <p:cNvSpPr/>
+            <p:nvPr/>
+          </p:nvSpPr>
+          <p:spPr>
+            <a:xfrm>
+              <a:off x="258539" y="2400865"/>
+              <a:ext cx="264080" cy="85903"/>
+            </a:xfrm>
+            <a:prstGeom prst="rect">
+              <a:avLst/>
+            </a:prstGeom>
+            <a:noFill/>
+          </p:spPr>
+          <p:txBody>
+            <a:bodyPr lIns="0" rIns="0" tIns="0" bIns="0" anchorCtr="1" anchor="ctr" wrap="none"/>
+            <a:lstStyle/>
+            <a:p>
+              <a:pPr algn="l" marL="0" marR="0" indent="0">
+                <a:lnSpc>
+                  <a:spcPts val="960"/>
+                </a:lnSpc>
+                <a:spcBef>
+                  <a:spcPts val="0"/>
+                </a:spcBef>
+                <a:spcAft>
+                  <a:spcPts val="0"/>
+                </a:spcAft>
+              </a:pPr>
+              <a:r>
+                <a:rPr sz="960">
+                  <a:solidFill>
+                    <a:srgbClr val="4D4D4D">
+                      <a:alpha val="100000"/>
+                    </a:srgbClr>
+                  </a:solidFill>
+                  <a:latin typeface="Times New Roman"/>
+                  <a:cs typeface="Times New Roman"/>
+                </a:rPr>
+                <a:t>-50%</a:t>
+              </a:r>
+            </a:p>
+          </p:txBody>
+        </p:sp>
+        <p:sp>
+          <p:nvSpPr>
+            <p:cNvPr id="228" name="tx228"/>
+            <p:cNvSpPr/>
+            <p:nvPr/>
+          </p:nvSpPr>
+          <p:spPr>
+            <a:xfrm>
+              <a:off x="360100" y="2103325"/>
               <a:ext cx="162520" cy="85903"/>
             </a:xfrm>
             <a:prstGeom prst="rect">
@@ -11937,59 +11897,13 @@
         </p:sp>
         <p:sp>
           <p:nvSpPr>
-            <p:cNvPr id="230" name="tx230"/>
-            <p:cNvSpPr/>
-            <p:nvPr/>
-          </p:nvSpPr>
-          <p:spPr>
-            <a:xfrm>
-              <a:off x="299140" y="2288395"/>
-              <a:ext cx="223480" cy="85903"/>
-            </a:xfrm>
-            <a:prstGeom prst="rect">
-              <a:avLst/>
-            </a:prstGeom>
-            <a:noFill/>
-          </p:spPr>
-          <p:txBody>
-            <a:bodyPr lIns="0" rIns="0" tIns="0" bIns="0" anchorCtr="1" anchor="ctr" wrap="none"/>
-            <a:lstStyle/>
-            <a:p>
-              <a:pPr algn="l" marL="0" marR="0" indent="0">
-                <a:lnSpc>
-                  <a:spcPts val="960"/>
-                </a:lnSpc>
-                <a:spcBef>
-                  <a:spcPts val="0"/>
-                </a:spcBef>
-                <a:spcAft>
-                  <a:spcPts val="0"/>
-                </a:spcAft>
-              </a:pPr>
-              <a:r>
-                <a:rPr sz="960">
-                  <a:solidFill>
-                    <a:srgbClr val="4D4D4D">
-                      <a:alpha val="100000"/>
-                    </a:srgbClr>
-                  </a:solidFill>
-                  <a:latin typeface="Times New Roman"/>
-                  <a:cs typeface="Times New Roman"/>
-                </a:rPr>
-                <a:t>25%</a:t>
-              </a:r>
-            </a:p>
-          </p:txBody>
-        </p:sp>
-        <p:sp>
-          <p:nvSpPr>
-            <p:cNvPr id="231" name="tx231"/>
-            <p:cNvSpPr/>
-            <p:nvPr/>
-          </p:nvSpPr>
-          <p:spPr>
-            <a:xfrm>
-              <a:off x="299140" y="2028345"/>
+            <p:cNvPr id="229" name="tx229"/>
+            <p:cNvSpPr/>
+            <p:nvPr/>
+          </p:nvSpPr>
+          <p:spPr>
+            <a:xfrm>
+              <a:off x="299140" y="1805785"/>
               <a:ext cx="223480" cy="85903"/>
             </a:xfrm>
             <a:prstGeom prst="rect">
@@ -12029,53 +11943,7 @@
         </p:sp>
         <p:sp>
           <p:nvSpPr>
-            <p:cNvPr id="232" name="tx232"/>
-            <p:cNvSpPr/>
-            <p:nvPr/>
-          </p:nvSpPr>
-          <p:spPr>
-            <a:xfrm>
-              <a:off x="299140" y="1768295"/>
-              <a:ext cx="223480" cy="85903"/>
-            </a:xfrm>
-            <a:prstGeom prst="rect">
-              <a:avLst/>
-            </a:prstGeom>
-            <a:noFill/>
-          </p:spPr>
-          <p:txBody>
-            <a:bodyPr lIns="0" rIns="0" tIns="0" bIns="0" anchorCtr="1" anchor="ctr" wrap="none"/>
-            <a:lstStyle/>
-            <a:p>
-              <a:pPr algn="l" marL="0" marR="0" indent="0">
-                <a:lnSpc>
-                  <a:spcPts val="960"/>
-                </a:lnSpc>
-                <a:spcBef>
-                  <a:spcPts val="0"/>
-                </a:spcBef>
-                <a:spcAft>
-                  <a:spcPts val="0"/>
-                </a:spcAft>
-              </a:pPr>
-              <a:r>
-                <a:rPr sz="960">
-                  <a:solidFill>
-                    <a:srgbClr val="4D4D4D">
-                      <a:alpha val="100000"/>
-                    </a:srgbClr>
-                  </a:solidFill>
-                  <a:latin typeface="Times New Roman"/>
-                  <a:cs typeface="Times New Roman"/>
-                </a:rPr>
-                <a:t>75%</a:t>
-              </a:r>
-            </a:p>
-          </p:txBody>
-        </p:sp>
-        <p:sp>
-          <p:nvSpPr>
-            <p:cNvPr id="233" name="tx233"/>
+            <p:cNvPr id="230" name="tx230"/>
             <p:cNvSpPr/>
             <p:nvPr/>
           </p:nvSpPr>
@@ -12121,13 +11989,13 @@
         </p:sp>
         <p:sp>
           <p:nvSpPr>
-            <p:cNvPr id="234" name="pl234"/>
-            <p:cNvSpPr/>
-            <p:nvPr/>
-          </p:nvSpPr>
-          <p:spPr>
-            <a:xfrm>
-              <a:off x="550455" y="2593986"/>
+            <p:cNvPr id="231" name="pl231"/>
+            <p:cNvSpPr/>
+            <p:nvPr/>
+          </p:nvSpPr>
+          <p:spPr>
+            <a:xfrm>
+              <a:off x="550455" y="2446406"/>
               <a:ext cx="34794" cy="0"/>
             </a:xfrm>
             <a:custGeom>
@@ -12161,13 +12029,13 @@
         </p:sp>
         <p:sp>
           <p:nvSpPr>
-            <p:cNvPr id="235" name="pl235"/>
-            <p:cNvSpPr/>
-            <p:nvPr/>
-          </p:nvSpPr>
-          <p:spPr>
-            <a:xfrm>
-              <a:off x="550455" y="2333936"/>
+            <p:cNvPr id="232" name="pl232"/>
+            <p:cNvSpPr/>
+            <p:nvPr/>
+          </p:nvSpPr>
+          <p:spPr>
+            <a:xfrm>
+              <a:off x="550455" y="2148866"/>
               <a:ext cx="34794" cy="0"/>
             </a:xfrm>
             <a:custGeom>
@@ -12201,13 +12069,13 @@
         </p:sp>
         <p:sp>
           <p:nvSpPr>
-            <p:cNvPr id="236" name="pl236"/>
-            <p:cNvSpPr/>
-            <p:nvPr/>
-          </p:nvSpPr>
-          <p:spPr>
-            <a:xfrm>
-              <a:off x="550455" y="2073886"/>
+            <p:cNvPr id="233" name="pl233"/>
+            <p:cNvSpPr/>
+            <p:nvPr/>
+          </p:nvSpPr>
+          <p:spPr>
+            <a:xfrm>
+              <a:off x="550455" y="1851326"/>
               <a:ext cx="34794" cy="0"/>
             </a:xfrm>
             <a:custGeom>
@@ -12241,13 +12109,13 @@
         </p:sp>
         <p:sp>
           <p:nvSpPr>
-            <p:cNvPr id="237" name="pl237"/>
-            <p:cNvSpPr/>
-            <p:nvPr/>
-          </p:nvSpPr>
-          <p:spPr>
-            <a:xfrm>
-              <a:off x="550455" y="1813836"/>
+            <p:cNvPr id="234" name="pl234"/>
+            <p:cNvSpPr/>
+            <p:nvPr/>
+          </p:nvSpPr>
+          <p:spPr>
+            <a:xfrm>
+              <a:off x="550455" y="1553786"/>
               <a:ext cx="34794" cy="0"/>
             </a:xfrm>
             <a:custGeom>
@@ -12281,47 +12149,7 @@
         </p:sp>
         <p:sp>
           <p:nvSpPr>
-            <p:cNvPr id="238" name="pl238"/>
-            <p:cNvSpPr/>
-            <p:nvPr/>
-          </p:nvSpPr>
-          <p:spPr>
-            <a:xfrm>
-              <a:off x="550455" y="1553786"/>
-              <a:ext cx="34794" cy="0"/>
-            </a:xfrm>
-            <a:custGeom>
-              <a:avLst/>
-              <a:pathLst>
-                <a:path w="34794" h="0">
-                  <a:moveTo>
-                    <a:pt x="0" y="0"/>
-                  </a:moveTo>
-                  <a:lnTo>
-                    <a:pt x="34794" y="0"/>
-                  </a:lnTo>
-                </a:path>
-              </a:pathLst>
-            </a:custGeom>
-            <a:ln w="13550" cap="flat">
-              <a:solidFill>
-                <a:srgbClr val="333333">
-                  <a:alpha val="100000"/>
-                </a:srgbClr>
-              </a:solidFill>
-              <a:prstDash val="solid"/>
-              <a:round/>
-            </a:ln>
-          </p:spPr>
-          <p:txBody>
-            <a:bodyPr/>
-            <a:lstStyle/>
-            <a:p/>
-          </p:txBody>
-        </p:sp>
-        <p:sp>
-          <p:nvSpPr>
-            <p:cNvPr id="239" name="tx239"/>
+            <p:cNvPr id="235" name="tx235"/>
             <p:cNvSpPr/>
             <p:nvPr/>
           </p:nvSpPr>

</xml_diff>

<commit_message>
Added independent conspecifics corrections for  allopatry and sympatry
</commit_message>
<xml_diff>
--- a/01_Localities/02_Cumulatives/figures/01_Prezygotics.pptx
+++ b/01_Localities/02_Cumulatives/figures/01_Prezygotics.pptx
@@ -6811,7 +6811,7 @@
           </p:nvSpPr>
           <p:spPr>
             <a:xfrm>
-              <a:off x="585250" y="2614349"/>
+              <a:off x="585250" y="2599563"/>
               <a:ext cx="1331687" cy="0"/>
             </a:xfrm>
             <a:custGeom>
@@ -6854,7 +6854,7 @@
           </p:nvSpPr>
           <p:spPr>
             <a:xfrm>
-              <a:off x="585250" y="2402236"/>
+              <a:off x="585250" y="2425267"/>
               <a:ext cx="1331687" cy="0"/>
             </a:xfrm>
             <a:custGeom>
@@ -6897,7 +6897,7 @@
           </p:nvSpPr>
           <p:spPr>
             <a:xfrm>
-              <a:off x="585250" y="2190124"/>
+              <a:off x="585250" y="2250971"/>
               <a:ext cx="1331687" cy="0"/>
             </a:xfrm>
             <a:custGeom>
@@ -6940,7 +6940,7 @@
           </p:nvSpPr>
           <p:spPr>
             <a:xfrm>
-              <a:off x="585250" y="1978011"/>
+              <a:off x="585250" y="2076675"/>
               <a:ext cx="1331687" cy="0"/>
             </a:xfrm>
             <a:custGeom>
@@ -6983,7 +6983,7 @@
           </p:nvSpPr>
           <p:spPr>
             <a:xfrm>
-              <a:off x="585250" y="1765899"/>
+              <a:off x="585250" y="1902379"/>
               <a:ext cx="1331687" cy="0"/>
             </a:xfrm>
             <a:custGeom>
@@ -7026,7 +7026,7 @@
           </p:nvSpPr>
           <p:spPr>
             <a:xfrm>
-              <a:off x="585250" y="1553786"/>
+              <a:off x="585250" y="1728083"/>
               <a:ext cx="1331687" cy="0"/>
             </a:xfrm>
             <a:custGeom>
@@ -7069,7 +7069,7 @@
           </p:nvSpPr>
           <p:spPr>
             <a:xfrm>
-              <a:off x="585250" y="2402236"/>
+              <a:off x="585250" y="1553786"/>
               <a:ext cx="1331687" cy="0"/>
             </a:xfrm>
             <a:custGeom>
@@ -7090,7 +7090,7 @@
             </a:custGeom>
             <a:ln w="13550" cap="flat">
               <a:solidFill>
-                <a:srgbClr val="000000">
+                <a:srgbClr val="BEBEBE">
                   <a:alpha val="100000"/>
                 </a:srgbClr>
               </a:solidFill>
@@ -7112,34 +7112,28 @@
           </p:nvSpPr>
           <p:spPr>
             <a:xfrm>
-              <a:off x="738906" y="1776080"/>
-              <a:ext cx="1024375" cy="514160"/>
+              <a:off x="585250" y="2250971"/>
+              <a:ext cx="1331687" cy="0"/>
             </a:xfrm>
             <a:custGeom>
               <a:avLst/>
               <a:pathLst>
-                <a:path w="1024375" h="514160">
+                <a:path w="1331687" h="0">
                   <a:moveTo>
-                    <a:pt x="0" y="514160"/>
+                    <a:pt x="0" y="0"/>
                   </a:moveTo>
                   <a:lnTo>
-                    <a:pt x="256093" y="362288"/>
-                  </a:lnTo>
-                  <a:lnTo>
-                    <a:pt x="512187" y="343622"/>
-                  </a:lnTo>
-                  <a:lnTo>
-                    <a:pt x="768281" y="0"/>
-                  </a:lnTo>
-                  <a:lnTo>
-                    <a:pt x="1024375" y="2545"/>
+                    <a:pt x="1331687" y="0"/>
+                  </a:lnTo>
+                  <a:lnTo>
+                    <a:pt x="1331687" y="0"/>
                   </a:lnTo>
                 </a:path>
               </a:pathLst>
             </a:custGeom>
             <a:ln w="13550" cap="flat">
               <a:solidFill>
-                <a:srgbClr val="7CAE00">
+                <a:srgbClr val="000000">
                   <a:alpha val="100000"/>
                 </a:srgbClr>
               </a:solidFill>
@@ -7161,33 +7155,82 @@
           </p:nvSpPr>
           <p:spPr>
             <a:xfrm>
-              <a:off x="738906" y="1992435"/>
-              <a:ext cx="1024375" cy="136600"/>
+              <a:off x="738906" y="2021597"/>
+              <a:ext cx="1024375" cy="172901"/>
             </a:xfrm>
             <a:custGeom>
               <a:avLst/>
               <a:pathLst>
-                <a:path w="1024375" h="136600">
+                <a:path w="1024375" h="172901">
                   <a:moveTo>
-                    <a:pt x="0" y="94177"/>
+                    <a:pt x="0" y="172901"/>
                   </a:moveTo>
                   <a:lnTo>
-                    <a:pt x="256093" y="136600"/>
-                  </a:lnTo>
-                  <a:lnTo>
-                    <a:pt x="512187" y="60239"/>
+                    <a:pt x="256093" y="124796"/>
+                  </a:lnTo>
+                  <a:lnTo>
+                    <a:pt x="512187" y="98303"/>
                   </a:lnTo>
                   <a:lnTo>
                     <a:pt x="768281" y="0"/>
                   </a:lnTo>
                   <a:lnTo>
-                    <a:pt x="1024375" y="61088"/>
+                    <a:pt x="1024375" y="0"/>
                   </a:lnTo>
                 </a:path>
               </a:pathLst>
             </a:custGeom>
             <a:ln w="13550" cap="flat">
               <a:solidFill>
+                <a:srgbClr val="7CAE00">
+                  <a:alpha val="100000"/>
+                </a:srgbClr>
+              </a:solidFill>
+              <a:prstDash val="solid"/>
+              <a:round/>
+            </a:ln>
+          </p:spPr>
+          <p:txBody>
+            <a:bodyPr/>
+            <a:lstStyle/>
+            <a:p/>
+          </p:txBody>
+        </p:sp>
+        <p:sp>
+          <p:nvSpPr>
+            <p:cNvPr id="111" name="pl111"/>
+            <p:cNvSpPr/>
+            <p:nvPr/>
+          </p:nvSpPr>
+          <p:spPr>
+            <a:xfrm>
+              <a:off x="738906" y="2017414"/>
+              <a:ext cx="1024375" cy="574480"/>
+            </a:xfrm>
+            <a:custGeom>
+              <a:avLst/>
+              <a:pathLst>
+                <a:path w="1024375" h="574480">
+                  <a:moveTo>
+                    <a:pt x="0" y="0"/>
+                  </a:moveTo>
+                  <a:lnTo>
+                    <a:pt x="256093" y="119915"/>
+                  </a:lnTo>
+                  <a:lnTo>
+                    <a:pt x="512187" y="35556"/>
+                  </a:lnTo>
+                  <a:lnTo>
+                    <a:pt x="768281" y="460141"/>
+                  </a:lnTo>
+                  <a:lnTo>
+                    <a:pt x="1024375" y="574480"/>
+                  </a:lnTo>
+                </a:path>
+              </a:pathLst>
+            </a:custGeom>
+            <a:ln w="13550" cap="flat">
+              <a:solidFill>
                 <a:srgbClr val="F8766D">
                   <a:alpha val="100000"/>
                 </a:srgbClr>
@@ -7204,13 +7247,13 @@
         </p:sp>
         <p:sp>
           <p:nvSpPr>
-            <p:cNvPr id="111" name="pt111"/>
-            <p:cNvSpPr/>
-            <p:nvPr/>
-          </p:nvSpPr>
-          <p:spPr>
-            <a:xfrm>
-              <a:off x="714080" y="2061787"/>
+            <p:cNvPr id="112" name="pt112"/>
+            <p:cNvSpPr/>
+            <p:nvPr/>
+          </p:nvSpPr>
+          <p:spPr>
+            <a:xfrm>
+              <a:off x="714080" y="1992588"/>
               <a:ext cx="49651" cy="49651"/>
             </a:xfrm>
             <a:prstGeom prst="ellipse">
@@ -7239,13 +7282,13 @@
         </p:sp>
         <p:sp>
           <p:nvSpPr>
-            <p:cNvPr id="112" name="pt112"/>
-            <p:cNvSpPr/>
-            <p:nvPr/>
-          </p:nvSpPr>
-          <p:spPr>
-            <a:xfrm>
-              <a:off x="714080" y="2265415"/>
+            <p:cNvPr id="113" name="pt113"/>
+            <p:cNvSpPr/>
+            <p:nvPr/>
+          </p:nvSpPr>
+          <p:spPr>
+            <a:xfrm>
+              <a:off x="714080" y="2169673"/>
               <a:ext cx="49651" cy="49651"/>
             </a:xfrm>
             <a:prstGeom prst="ellipse">
@@ -7274,13 +7317,13 @@
         </p:sp>
         <p:sp>
           <p:nvSpPr>
-            <p:cNvPr id="113" name="pt113"/>
-            <p:cNvSpPr/>
-            <p:nvPr/>
-          </p:nvSpPr>
-          <p:spPr>
-            <a:xfrm>
-              <a:off x="970174" y="2104209"/>
+            <p:cNvPr id="114" name="pt114"/>
+            <p:cNvSpPr/>
+            <p:nvPr/>
+          </p:nvSpPr>
+          <p:spPr>
+            <a:xfrm>
+              <a:off x="970174" y="2112504"/>
               <a:ext cx="49651" cy="49651"/>
             </a:xfrm>
             <a:prstGeom prst="ellipse">
@@ -7309,13 +7352,13 @@
         </p:sp>
         <p:sp>
           <p:nvSpPr>
-            <p:cNvPr id="114" name="pt114"/>
-            <p:cNvSpPr/>
-            <p:nvPr/>
-          </p:nvSpPr>
-          <p:spPr>
-            <a:xfrm>
-              <a:off x="970174" y="2113542"/>
+            <p:cNvPr id="115" name="pt115"/>
+            <p:cNvSpPr/>
+            <p:nvPr/>
+          </p:nvSpPr>
+          <p:spPr>
+            <a:xfrm>
+              <a:off x="970174" y="2121567"/>
               <a:ext cx="49651" cy="49651"/>
             </a:xfrm>
             <a:prstGeom prst="ellipse">
@@ -7344,13 +7387,13 @@
         </p:sp>
         <p:sp>
           <p:nvSpPr>
-            <p:cNvPr id="115" name="pt115"/>
-            <p:cNvSpPr/>
-            <p:nvPr/>
-          </p:nvSpPr>
-          <p:spPr>
-            <a:xfrm>
-              <a:off x="1226268" y="2027849"/>
+            <p:cNvPr id="116" name="pt116"/>
+            <p:cNvSpPr/>
+            <p:nvPr/>
+          </p:nvSpPr>
+          <p:spPr>
+            <a:xfrm>
+              <a:off x="1226268" y="2028145"/>
               <a:ext cx="49651" cy="49651"/>
             </a:xfrm>
             <a:prstGeom prst="ellipse">
@@ -7379,13 +7422,13 @@
         </p:sp>
         <p:sp>
           <p:nvSpPr>
-            <p:cNvPr id="116" name="pt116"/>
-            <p:cNvSpPr/>
-            <p:nvPr/>
-          </p:nvSpPr>
-          <p:spPr>
-            <a:xfrm>
-              <a:off x="1226268" y="2094877"/>
+            <p:cNvPr id="117" name="pt117"/>
+            <p:cNvSpPr/>
+            <p:nvPr/>
+          </p:nvSpPr>
+          <p:spPr>
+            <a:xfrm>
+              <a:off x="1226268" y="2095074"/>
               <a:ext cx="49651" cy="49651"/>
             </a:xfrm>
             <a:prstGeom prst="ellipse">
@@ -7414,13 +7457,13 @@
         </p:sp>
         <p:sp>
           <p:nvSpPr>
-            <p:cNvPr id="117" name="pt117"/>
-            <p:cNvSpPr/>
-            <p:nvPr/>
-          </p:nvSpPr>
-          <p:spPr>
-            <a:xfrm>
-              <a:off x="1482362" y="1967609"/>
+            <p:cNvPr id="118" name="pt118"/>
+            <p:cNvSpPr/>
+            <p:nvPr/>
+          </p:nvSpPr>
+          <p:spPr>
+            <a:xfrm>
+              <a:off x="1482362" y="2452730"/>
               <a:ext cx="49651" cy="49651"/>
             </a:xfrm>
             <a:prstGeom prst="ellipse">
@@ -7449,13 +7492,13 @@
         </p:sp>
         <p:sp>
           <p:nvSpPr>
-            <p:cNvPr id="118" name="pt118"/>
-            <p:cNvSpPr/>
-            <p:nvPr/>
-          </p:nvSpPr>
-          <p:spPr>
-            <a:xfrm>
-              <a:off x="1482362" y="1751254"/>
+            <p:cNvPr id="119" name="pt119"/>
+            <p:cNvSpPr/>
+            <p:nvPr/>
+          </p:nvSpPr>
+          <p:spPr>
+            <a:xfrm>
+              <a:off x="1482362" y="1996771"/>
               <a:ext cx="49651" cy="49651"/>
             </a:xfrm>
             <a:prstGeom prst="ellipse">
@@ -7484,13 +7527,13 @@
         </p:sp>
         <p:sp>
           <p:nvSpPr>
-            <p:cNvPr id="119" name="pt119"/>
-            <p:cNvSpPr/>
-            <p:nvPr/>
-          </p:nvSpPr>
-          <p:spPr>
-            <a:xfrm>
-              <a:off x="1738456" y="2028697"/>
+            <p:cNvPr id="120" name="pt120"/>
+            <p:cNvSpPr/>
+            <p:nvPr/>
+          </p:nvSpPr>
+          <p:spPr>
+            <a:xfrm>
+              <a:off x="1738456" y="2567068"/>
               <a:ext cx="49651" cy="49651"/>
             </a:xfrm>
             <a:prstGeom prst="ellipse">
@@ -7519,13 +7562,13 @@
         </p:sp>
         <p:sp>
           <p:nvSpPr>
-            <p:cNvPr id="120" name="pt120"/>
-            <p:cNvSpPr/>
-            <p:nvPr/>
-          </p:nvSpPr>
-          <p:spPr>
-            <a:xfrm>
-              <a:off x="1738456" y="1753800"/>
+            <p:cNvPr id="121" name="pt121"/>
+            <p:cNvSpPr/>
+            <p:nvPr/>
+          </p:nvSpPr>
+          <p:spPr>
+            <a:xfrm>
+              <a:off x="1738456" y="1996771"/>
               <a:ext cx="49651" cy="49651"/>
             </a:xfrm>
             <a:prstGeom prst="ellipse">
@@ -7554,7 +7597,7 @@
         </p:sp>
         <p:sp>
           <p:nvSpPr>
-            <p:cNvPr id="121" name="rc121"/>
+            <p:cNvPr id="122" name="rc122"/>
             <p:cNvSpPr/>
             <p:nvPr/>
           </p:nvSpPr>
@@ -7580,13 +7623,13 @@
         </p:sp>
         <p:sp>
           <p:nvSpPr>
-            <p:cNvPr id="122" name="pl122"/>
-            <p:cNvSpPr/>
-            <p:nvPr/>
-          </p:nvSpPr>
-          <p:spPr>
-            <a:xfrm>
-              <a:off x="1986527" y="2614349"/>
+            <p:cNvPr id="123" name="pl123"/>
+            <p:cNvSpPr/>
+            <p:nvPr/>
+          </p:nvSpPr>
+          <p:spPr>
+            <a:xfrm>
+              <a:off x="1986527" y="2599563"/>
               <a:ext cx="1331687" cy="0"/>
             </a:xfrm>
             <a:custGeom>
@@ -7623,13 +7666,13 @@
         </p:sp>
         <p:sp>
           <p:nvSpPr>
-            <p:cNvPr id="123" name="pl123"/>
-            <p:cNvSpPr/>
-            <p:nvPr/>
-          </p:nvSpPr>
-          <p:spPr>
-            <a:xfrm>
-              <a:off x="1986527" y="2402236"/>
+            <p:cNvPr id="124" name="pl124"/>
+            <p:cNvSpPr/>
+            <p:nvPr/>
+          </p:nvSpPr>
+          <p:spPr>
+            <a:xfrm>
+              <a:off x="1986527" y="2425267"/>
               <a:ext cx="1331687" cy="0"/>
             </a:xfrm>
             <a:custGeom>
@@ -7666,13 +7709,13 @@
         </p:sp>
         <p:sp>
           <p:nvSpPr>
-            <p:cNvPr id="124" name="pl124"/>
-            <p:cNvSpPr/>
-            <p:nvPr/>
-          </p:nvSpPr>
-          <p:spPr>
-            <a:xfrm>
-              <a:off x="1986527" y="2190124"/>
+            <p:cNvPr id="125" name="pl125"/>
+            <p:cNvSpPr/>
+            <p:nvPr/>
+          </p:nvSpPr>
+          <p:spPr>
+            <a:xfrm>
+              <a:off x="1986527" y="2250971"/>
               <a:ext cx="1331687" cy="0"/>
             </a:xfrm>
             <a:custGeom>
@@ -7709,13 +7752,13 @@
         </p:sp>
         <p:sp>
           <p:nvSpPr>
-            <p:cNvPr id="125" name="pl125"/>
-            <p:cNvSpPr/>
-            <p:nvPr/>
-          </p:nvSpPr>
-          <p:spPr>
-            <a:xfrm>
-              <a:off x="1986527" y="1978011"/>
+            <p:cNvPr id="126" name="pl126"/>
+            <p:cNvSpPr/>
+            <p:nvPr/>
+          </p:nvSpPr>
+          <p:spPr>
+            <a:xfrm>
+              <a:off x="1986527" y="2076675"/>
               <a:ext cx="1331687" cy="0"/>
             </a:xfrm>
             <a:custGeom>
@@ -7752,13 +7795,13 @@
         </p:sp>
         <p:sp>
           <p:nvSpPr>
-            <p:cNvPr id="126" name="pl126"/>
-            <p:cNvSpPr/>
-            <p:nvPr/>
-          </p:nvSpPr>
-          <p:spPr>
-            <a:xfrm>
-              <a:off x="1986527" y="1765899"/>
+            <p:cNvPr id="127" name="pl127"/>
+            <p:cNvSpPr/>
+            <p:nvPr/>
+          </p:nvSpPr>
+          <p:spPr>
+            <a:xfrm>
+              <a:off x="1986527" y="1902379"/>
               <a:ext cx="1331687" cy="0"/>
             </a:xfrm>
             <a:custGeom>
@@ -7795,13 +7838,13 @@
         </p:sp>
         <p:sp>
           <p:nvSpPr>
-            <p:cNvPr id="127" name="pl127"/>
-            <p:cNvSpPr/>
-            <p:nvPr/>
-          </p:nvSpPr>
-          <p:spPr>
-            <a:xfrm>
-              <a:off x="1986527" y="1553786"/>
+            <p:cNvPr id="128" name="pl128"/>
+            <p:cNvSpPr/>
+            <p:nvPr/>
+          </p:nvSpPr>
+          <p:spPr>
+            <a:xfrm>
+              <a:off x="1986527" y="1728083"/>
               <a:ext cx="1331687" cy="0"/>
             </a:xfrm>
             <a:custGeom>
@@ -7838,13 +7881,13 @@
         </p:sp>
         <p:sp>
           <p:nvSpPr>
-            <p:cNvPr id="128" name="pl128"/>
-            <p:cNvSpPr/>
-            <p:nvPr/>
-          </p:nvSpPr>
-          <p:spPr>
-            <a:xfrm>
-              <a:off x="1986527" y="2402236"/>
+            <p:cNvPr id="129" name="pl129"/>
+            <p:cNvSpPr/>
+            <p:nvPr/>
+          </p:nvSpPr>
+          <p:spPr>
+            <a:xfrm>
+              <a:off x="1986527" y="1553786"/>
               <a:ext cx="1331687" cy="0"/>
             </a:xfrm>
             <a:custGeom>
@@ -7865,55 +7908,98 @@
             </a:custGeom>
             <a:ln w="13550" cap="flat">
               <a:solidFill>
-                <a:srgbClr val="000000">
-                  <a:alpha val="100000"/>
-                </a:srgbClr>
-              </a:solidFill>
-              <a:prstDash val="solid"/>
-              <a:round/>
-            </a:ln>
-          </p:spPr>
-          <p:txBody>
-            <a:bodyPr/>
-            <a:lstStyle/>
-            <a:p/>
-          </p:txBody>
-        </p:sp>
-        <p:sp>
-          <p:nvSpPr>
-            <p:cNvPr id="129" name="pl129"/>
-            <p:cNvSpPr/>
-            <p:nvPr/>
-          </p:nvSpPr>
-          <p:spPr>
-            <a:xfrm>
-              <a:off x="2140183" y="1834623"/>
-              <a:ext cx="1024375" cy="759362"/>
+                <a:srgbClr val="BEBEBE">
+                  <a:alpha val="100000"/>
+                </a:srgbClr>
+              </a:solidFill>
+              <a:prstDash val="solid"/>
+              <a:round/>
+            </a:ln>
+          </p:spPr>
+          <p:txBody>
+            <a:bodyPr/>
+            <a:lstStyle/>
+            <a:p/>
+          </p:txBody>
+        </p:sp>
+        <p:sp>
+          <p:nvSpPr>
+            <p:cNvPr id="130" name="pl130"/>
+            <p:cNvSpPr/>
+            <p:nvPr/>
+          </p:nvSpPr>
+          <p:spPr>
+            <a:xfrm>
+              <a:off x="1986527" y="2250971"/>
+              <a:ext cx="1331687" cy="0"/>
             </a:xfrm>
             <a:custGeom>
               <a:avLst/>
               <a:pathLst>
-                <a:path w="1024375" h="759362">
+                <a:path w="1331687" h="0">
                   <a:moveTo>
-                    <a:pt x="0" y="607489"/>
+                    <a:pt x="0" y="0"/>
                   </a:moveTo>
                   <a:lnTo>
-                    <a:pt x="256093" y="677911"/>
-                  </a:lnTo>
-                  <a:lnTo>
-                    <a:pt x="512187" y="759362"/>
-                  </a:lnTo>
-                  <a:lnTo>
-                    <a:pt x="768281" y="137448"/>
-                  </a:lnTo>
-                  <a:lnTo>
-                    <a:pt x="1024375" y="0"/>
+                    <a:pt x="1331687" y="0"/>
+                  </a:lnTo>
+                  <a:lnTo>
+                    <a:pt x="1331687" y="0"/>
                   </a:lnTo>
                 </a:path>
               </a:pathLst>
             </a:custGeom>
             <a:ln w="13550" cap="flat">
               <a:solidFill>
+                <a:srgbClr val="000000">
+                  <a:alpha val="100000"/>
+                </a:srgbClr>
+              </a:solidFill>
+              <a:prstDash val="solid"/>
+              <a:round/>
+            </a:ln>
+          </p:spPr>
+          <p:txBody>
+            <a:bodyPr/>
+            <a:lstStyle/>
+            <a:p/>
+          </p:txBody>
+        </p:sp>
+        <p:sp>
+          <p:nvSpPr>
+            <p:cNvPr id="131" name="pl131"/>
+            <p:cNvSpPr/>
+            <p:nvPr/>
+          </p:nvSpPr>
+          <p:spPr>
+            <a:xfrm>
+              <a:off x="2140183" y="2137330"/>
+              <a:ext cx="1024375" cy="456655"/>
+            </a:xfrm>
+            <a:custGeom>
+              <a:avLst/>
+              <a:pathLst>
+                <a:path w="1024375" h="456655">
+                  <a:moveTo>
+                    <a:pt x="0" y="188937"/>
+                  </a:moveTo>
+                  <a:lnTo>
+                    <a:pt x="256093" y="388331"/>
+                  </a:lnTo>
+                  <a:lnTo>
+                    <a:pt x="512187" y="456655"/>
+                  </a:lnTo>
+                  <a:lnTo>
+                    <a:pt x="768281" y="297697"/>
+                  </a:lnTo>
+                  <a:lnTo>
+                    <a:pt x="1024375" y="0"/>
+                  </a:lnTo>
+                </a:path>
+              </a:pathLst>
+            </a:custGeom>
+            <a:ln w="13550" cap="flat">
+              <a:solidFill>
                 <a:srgbClr val="F8766D">
                   <a:alpha val="100000"/>
                 </a:srgbClr>
@@ -7930,13 +8016,13 @@
         </p:sp>
         <p:sp>
           <p:nvSpPr>
-            <p:cNvPr id="130" name="pt130"/>
-            <p:cNvSpPr/>
-            <p:nvPr/>
-          </p:nvSpPr>
-          <p:spPr>
-            <a:xfrm>
-              <a:off x="2115357" y="2417287"/>
+            <p:cNvPr id="132" name="pt132"/>
+            <p:cNvSpPr/>
+            <p:nvPr/>
+          </p:nvSpPr>
+          <p:spPr>
+            <a:xfrm>
+              <a:off x="2115357" y="2301441"/>
               <a:ext cx="49651" cy="49651"/>
             </a:xfrm>
             <a:prstGeom prst="ellipse">
@@ -7965,13 +8051,13 @@
         </p:sp>
         <p:sp>
           <p:nvSpPr>
-            <p:cNvPr id="131" name="pt131"/>
-            <p:cNvSpPr/>
-            <p:nvPr/>
-          </p:nvSpPr>
-          <p:spPr>
-            <a:xfrm>
-              <a:off x="2371451" y="2487709"/>
+            <p:cNvPr id="133" name="pt133"/>
+            <p:cNvSpPr/>
+            <p:nvPr/>
+          </p:nvSpPr>
+          <p:spPr>
+            <a:xfrm>
+              <a:off x="2371451" y="2500836"/>
               <a:ext cx="49651" cy="49651"/>
             </a:xfrm>
             <a:prstGeom prst="ellipse">
@@ -8000,7 +8086,7 @@
         </p:sp>
         <p:sp>
           <p:nvSpPr>
-            <p:cNvPr id="132" name="pt132"/>
+            <p:cNvPr id="134" name="pt134"/>
             <p:cNvSpPr/>
             <p:nvPr/>
           </p:nvSpPr>
@@ -8035,13 +8121,13 @@
         </p:sp>
         <p:sp>
           <p:nvSpPr>
-            <p:cNvPr id="133" name="pt133"/>
-            <p:cNvSpPr/>
-            <p:nvPr/>
-          </p:nvSpPr>
-          <p:spPr>
-            <a:xfrm>
-              <a:off x="2883639" y="1947246"/>
+            <p:cNvPr id="135" name="pt135"/>
+            <p:cNvSpPr/>
+            <p:nvPr/>
+          </p:nvSpPr>
+          <p:spPr>
+            <a:xfrm>
+              <a:off x="2883639" y="2410202"/>
               <a:ext cx="49651" cy="49651"/>
             </a:xfrm>
             <a:prstGeom prst="ellipse">
@@ -8070,13 +8156,13 @@
         </p:sp>
         <p:sp>
           <p:nvSpPr>
-            <p:cNvPr id="134" name="pt134"/>
-            <p:cNvSpPr/>
-            <p:nvPr/>
-          </p:nvSpPr>
-          <p:spPr>
-            <a:xfrm>
-              <a:off x="3139733" y="1809797"/>
+            <p:cNvPr id="136" name="pt136"/>
+            <p:cNvSpPr/>
+            <p:nvPr/>
+          </p:nvSpPr>
+          <p:spPr>
+            <a:xfrm>
+              <a:off x="3139733" y="2112504"/>
               <a:ext cx="49651" cy="49651"/>
             </a:xfrm>
             <a:prstGeom prst="ellipse">
@@ -8105,7 +8191,7 @@
         </p:sp>
         <p:sp>
           <p:nvSpPr>
-            <p:cNvPr id="135" name="rc135"/>
+            <p:cNvPr id="137" name="rc137"/>
             <p:cNvSpPr/>
             <p:nvPr/>
           </p:nvSpPr>
@@ -8131,13 +8217,13 @@
         </p:sp>
         <p:sp>
           <p:nvSpPr>
-            <p:cNvPr id="136" name="pl136"/>
-            <p:cNvSpPr/>
-            <p:nvPr/>
-          </p:nvSpPr>
-          <p:spPr>
-            <a:xfrm>
-              <a:off x="3387804" y="2614349"/>
+            <p:cNvPr id="138" name="pl138"/>
+            <p:cNvSpPr/>
+            <p:nvPr/>
+          </p:nvSpPr>
+          <p:spPr>
+            <a:xfrm>
+              <a:off x="3387804" y="2599563"/>
               <a:ext cx="1331687" cy="0"/>
             </a:xfrm>
             <a:custGeom>
@@ -8174,13 +8260,13 @@
         </p:sp>
         <p:sp>
           <p:nvSpPr>
-            <p:cNvPr id="137" name="pl137"/>
-            <p:cNvSpPr/>
-            <p:nvPr/>
-          </p:nvSpPr>
-          <p:spPr>
-            <a:xfrm>
-              <a:off x="3387804" y="2402236"/>
+            <p:cNvPr id="139" name="pl139"/>
+            <p:cNvSpPr/>
+            <p:nvPr/>
+          </p:nvSpPr>
+          <p:spPr>
+            <a:xfrm>
+              <a:off x="3387804" y="2425267"/>
               <a:ext cx="1331687" cy="0"/>
             </a:xfrm>
             <a:custGeom>
@@ -8217,13 +8303,13 @@
         </p:sp>
         <p:sp>
           <p:nvSpPr>
-            <p:cNvPr id="138" name="pl138"/>
-            <p:cNvSpPr/>
-            <p:nvPr/>
-          </p:nvSpPr>
-          <p:spPr>
-            <a:xfrm>
-              <a:off x="3387804" y="2190124"/>
+            <p:cNvPr id="140" name="pl140"/>
+            <p:cNvSpPr/>
+            <p:nvPr/>
+          </p:nvSpPr>
+          <p:spPr>
+            <a:xfrm>
+              <a:off x="3387804" y="2250971"/>
               <a:ext cx="1331687" cy="0"/>
             </a:xfrm>
             <a:custGeom>
@@ -8260,13 +8346,13 @@
         </p:sp>
         <p:sp>
           <p:nvSpPr>
-            <p:cNvPr id="139" name="pl139"/>
-            <p:cNvSpPr/>
-            <p:nvPr/>
-          </p:nvSpPr>
-          <p:spPr>
-            <a:xfrm>
-              <a:off x="3387804" y="1978011"/>
+            <p:cNvPr id="141" name="pl141"/>
+            <p:cNvSpPr/>
+            <p:nvPr/>
+          </p:nvSpPr>
+          <p:spPr>
+            <a:xfrm>
+              <a:off x="3387804" y="2076675"/>
               <a:ext cx="1331687" cy="0"/>
             </a:xfrm>
             <a:custGeom>
@@ -8303,13 +8389,13 @@
         </p:sp>
         <p:sp>
           <p:nvSpPr>
-            <p:cNvPr id="140" name="pl140"/>
-            <p:cNvSpPr/>
-            <p:nvPr/>
-          </p:nvSpPr>
-          <p:spPr>
-            <a:xfrm>
-              <a:off x="3387804" y="1765899"/>
+            <p:cNvPr id="142" name="pl142"/>
+            <p:cNvSpPr/>
+            <p:nvPr/>
+          </p:nvSpPr>
+          <p:spPr>
+            <a:xfrm>
+              <a:off x="3387804" y="1902379"/>
               <a:ext cx="1331687" cy="0"/>
             </a:xfrm>
             <a:custGeom>
@@ -8346,13 +8432,13 @@
         </p:sp>
         <p:sp>
           <p:nvSpPr>
-            <p:cNvPr id="141" name="pl141"/>
-            <p:cNvSpPr/>
-            <p:nvPr/>
-          </p:nvSpPr>
-          <p:spPr>
-            <a:xfrm>
-              <a:off x="3387804" y="1553786"/>
+            <p:cNvPr id="143" name="pl143"/>
+            <p:cNvSpPr/>
+            <p:nvPr/>
+          </p:nvSpPr>
+          <p:spPr>
+            <a:xfrm>
+              <a:off x="3387804" y="1728083"/>
               <a:ext cx="1331687" cy="0"/>
             </a:xfrm>
             <a:custGeom>
@@ -8389,13 +8475,13 @@
         </p:sp>
         <p:sp>
           <p:nvSpPr>
-            <p:cNvPr id="142" name="pl142"/>
-            <p:cNvSpPr/>
-            <p:nvPr/>
-          </p:nvSpPr>
-          <p:spPr>
-            <a:xfrm>
-              <a:off x="3387804" y="2402236"/>
+            <p:cNvPr id="144" name="pl144"/>
+            <p:cNvSpPr/>
+            <p:nvPr/>
+          </p:nvSpPr>
+          <p:spPr>
+            <a:xfrm>
+              <a:off x="3387804" y="1553786"/>
               <a:ext cx="1331687" cy="0"/>
             </a:xfrm>
             <a:custGeom>
@@ -8416,95 +8502,89 @@
             </a:custGeom>
             <a:ln w="13550" cap="flat">
               <a:solidFill>
-                <a:srgbClr val="000000">
-                  <a:alpha val="100000"/>
-                </a:srgbClr>
-              </a:solidFill>
-              <a:prstDash val="solid"/>
-              <a:round/>
-            </a:ln>
-          </p:spPr>
-          <p:txBody>
-            <a:bodyPr/>
-            <a:lstStyle/>
-            <a:p/>
-          </p:txBody>
-        </p:sp>
-        <p:sp>
-          <p:nvSpPr>
-            <p:cNvPr id="143" name="pl143"/>
-            <p:cNvSpPr/>
-            <p:nvPr/>
-          </p:nvSpPr>
-          <p:spPr>
-            <a:xfrm>
-              <a:off x="3541460" y="1723476"/>
-              <a:ext cx="1024375" cy="535371"/>
+                <a:srgbClr val="BEBEBE">
+                  <a:alpha val="100000"/>
+                </a:srgbClr>
+              </a:solidFill>
+              <a:prstDash val="solid"/>
+              <a:round/>
+            </a:ln>
+          </p:spPr>
+          <p:txBody>
+            <a:bodyPr/>
+            <a:lstStyle/>
+            <a:p/>
+          </p:txBody>
+        </p:sp>
+        <p:sp>
+          <p:nvSpPr>
+            <p:cNvPr id="145" name="pl145"/>
+            <p:cNvSpPr/>
+            <p:nvPr/>
+          </p:nvSpPr>
+          <p:spPr>
+            <a:xfrm>
+              <a:off x="3387804" y="2250971"/>
+              <a:ext cx="1331687" cy="0"/>
             </a:xfrm>
             <a:custGeom>
               <a:avLst/>
               <a:pathLst>
-                <a:path w="1024375" h="535371">
+                <a:path w="1331687" h="0">
                   <a:moveTo>
-                    <a:pt x="0" y="535371"/>
+                    <a:pt x="0" y="0"/>
                   </a:moveTo>
                   <a:lnTo>
-                    <a:pt x="256093" y="439496"/>
-                  </a:lnTo>
-                  <a:lnTo>
-                    <a:pt x="512187" y="453072"/>
-                  </a:lnTo>
-                  <a:lnTo>
-                    <a:pt x="768281" y="48361"/>
-                  </a:lnTo>
-                  <a:lnTo>
-                    <a:pt x="1024375" y="0"/>
+                    <a:pt x="1331687" y="0"/>
+                  </a:lnTo>
+                  <a:lnTo>
+                    <a:pt x="1331687" y="0"/>
                   </a:lnTo>
                 </a:path>
               </a:pathLst>
             </a:custGeom>
             <a:ln w="13550" cap="flat">
               <a:solidFill>
-                <a:srgbClr val="7CAE00">
-                  <a:alpha val="100000"/>
-                </a:srgbClr>
-              </a:solidFill>
-              <a:prstDash val="solid"/>
-              <a:round/>
-            </a:ln>
-          </p:spPr>
-          <p:txBody>
-            <a:bodyPr/>
-            <a:lstStyle/>
-            <a:p/>
-          </p:txBody>
-        </p:sp>
-        <p:sp>
-          <p:nvSpPr>
-            <p:cNvPr id="144" name="pl144"/>
-            <p:cNvSpPr/>
-            <p:nvPr/>
-          </p:nvSpPr>
-          <p:spPr>
-            <a:xfrm>
-              <a:off x="3541460" y="1742991"/>
-              <a:ext cx="1024375" cy="464101"/>
+                <a:srgbClr val="000000">
+                  <a:alpha val="100000"/>
+                </a:srgbClr>
+              </a:solidFill>
+              <a:prstDash val="solid"/>
+              <a:round/>
+            </a:ln>
+          </p:spPr>
+          <p:txBody>
+            <a:bodyPr/>
+            <a:lstStyle/>
+            <a:p/>
+          </p:txBody>
+        </p:sp>
+        <p:sp>
+          <p:nvSpPr>
+            <p:cNvPr id="146" name="pl146"/>
+            <p:cNvSpPr/>
+            <p:nvPr/>
+          </p:nvSpPr>
+          <p:spPr>
+            <a:xfrm>
+              <a:off x="3541460" y="1905865"/>
+              <a:ext cx="1024375" cy="271204"/>
             </a:xfrm>
             <a:custGeom>
               <a:avLst/>
               <a:pathLst>
-                <a:path w="1024375" h="464101">
+                <a:path w="1024375" h="271204">
                   <a:moveTo>
-                    <a:pt x="0" y="464101"/>
+                    <a:pt x="0" y="261444"/>
                   </a:moveTo>
                   <a:lnTo>
-                    <a:pt x="256093" y="318168"/>
-                  </a:lnTo>
-                  <a:lnTo>
-                    <a:pt x="512187" y="361439"/>
-                  </a:lnTo>
-                  <a:lnTo>
-                    <a:pt x="768281" y="61088"/>
+                    <a:pt x="256093" y="264930"/>
+                  </a:lnTo>
+                  <a:lnTo>
+                    <a:pt x="512187" y="271204"/>
+                  </a:lnTo>
+                  <a:lnTo>
+                    <a:pt x="768281" y="107366"/>
                   </a:lnTo>
                   <a:lnTo>
                     <a:pt x="1024375" y="0"/>
@@ -8514,55 +8594,104 @@
             </a:custGeom>
             <a:ln w="13550" cap="flat">
               <a:solidFill>
-                <a:srgbClr val="00BFC4">
-                  <a:alpha val="100000"/>
-                </a:srgbClr>
-              </a:solidFill>
-              <a:prstDash val="solid"/>
-              <a:round/>
-            </a:ln>
-          </p:spPr>
-          <p:txBody>
-            <a:bodyPr/>
-            <a:lstStyle/>
-            <a:p/>
-          </p:txBody>
-        </p:sp>
-        <p:sp>
-          <p:nvSpPr>
-            <p:cNvPr id="145" name="pl145"/>
-            <p:cNvSpPr/>
-            <p:nvPr/>
-          </p:nvSpPr>
-          <p:spPr>
-            <a:xfrm>
-              <a:off x="3541460" y="1805776"/>
-              <a:ext cx="1024375" cy="636337"/>
+                <a:srgbClr val="7CAE00">
+                  <a:alpha val="100000"/>
+                </a:srgbClr>
+              </a:solidFill>
+              <a:prstDash val="solid"/>
+              <a:round/>
+            </a:ln>
+          </p:spPr>
+          <p:txBody>
+            <a:bodyPr/>
+            <a:lstStyle/>
+            <a:p/>
+          </p:txBody>
+        </p:sp>
+        <p:sp>
+          <p:nvSpPr>
+            <p:cNvPr id="147" name="pl147"/>
+            <p:cNvSpPr/>
+            <p:nvPr/>
+          </p:nvSpPr>
+          <p:spPr>
+            <a:xfrm>
+              <a:off x="3541460" y="1946301"/>
+              <a:ext cx="1024375" cy="175690"/>
             </a:xfrm>
             <a:custGeom>
               <a:avLst/>
               <a:pathLst>
-                <a:path w="1024375" h="636337">
+                <a:path w="1024375" h="175690">
                   <a:moveTo>
-                    <a:pt x="0" y="636337"/>
+                    <a:pt x="0" y="175690"/>
                   </a:moveTo>
                   <a:lnTo>
-                    <a:pt x="256093" y="432709"/>
-                  </a:lnTo>
-                  <a:lnTo>
-                    <a:pt x="512187" y="288472"/>
-                  </a:lnTo>
-                  <a:lnTo>
-                    <a:pt x="768281" y="0"/>
-                  </a:lnTo>
-                  <a:lnTo>
-                    <a:pt x="1024375" y="14423"/>
+                    <a:pt x="256093" y="122007"/>
+                  </a:lnTo>
+                  <a:lnTo>
+                    <a:pt x="512187" y="158260"/>
+                  </a:lnTo>
+                  <a:lnTo>
+                    <a:pt x="768281" y="133859"/>
+                  </a:lnTo>
+                  <a:lnTo>
+                    <a:pt x="1024375" y="0"/>
                   </a:lnTo>
                 </a:path>
               </a:pathLst>
             </a:custGeom>
             <a:ln w="13550" cap="flat">
               <a:solidFill>
+                <a:srgbClr val="00BFC4">
+                  <a:alpha val="100000"/>
+                </a:srgbClr>
+              </a:solidFill>
+              <a:prstDash val="solid"/>
+              <a:round/>
+            </a:ln>
+          </p:spPr>
+          <p:txBody>
+            <a:bodyPr/>
+            <a:lstStyle/>
+            <a:p/>
+          </p:txBody>
+        </p:sp>
+        <p:sp>
+          <p:nvSpPr>
+            <p:cNvPr id="148" name="pl148"/>
+            <p:cNvSpPr/>
+            <p:nvPr/>
+          </p:nvSpPr>
+          <p:spPr>
+            <a:xfrm>
+              <a:off x="3541460" y="2084344"/>
+              <a:ext cx="1024375" cy="241923"/>
+            </a:xfrm>
+            <a:custGeom>
+              <a:avLst/>
+              <a:pathLst>
+                <a:path w="1024375" h="241923">
+                  <a:moveTo>
+                    <a:pt x="0" y="241923"/>
+                  </a:moveTo>
+                  <a:lnTo>
+                    <a:pt x="256093" y="163838"/>
+                  </a:lnTo>
+                  <a:lnTo>
+                    <a:pt x="512187" y="9760"/>
+                  </a:lnTo>
+                  <a:lnTo>
+                    <a:pt x="768281" y="0"/>
+                  </a:lnTo>
+                  <a:lnTo>
+                    <a:pt x="1024375" y="22309"/>
+                  </a:lnTo>
+                </a:path>
+              </a:pathLst>
+            </a:custGeom>
+            <a:ln w="13550" cap="flat">
+              <a:solidFill>
                 <a:srgbClr val="F8766D">
                   <a:alpha val="100000"/>
                 </a:srgbClr>
@@ -8579,13 +8708,13 @@
         </p:sp>
         <p:sp>
           <p:nvSpPr>
-            <p:cNvPr id="146" name="pt146"/>
-            <p:cNvSpPr/>
-            <p:nvPr/>
-          </p:nvSpPr>
-          <p:spPr>
-            <a:xfrm>
-              <a:off x="3516634" y="2417287"/>
+            <p:cNvPr id="149" name="pt149"/>
+            <p:cNvSpPr/>
+            <p:nvPr/>
+          </p:nvSpPr>
+          <p:spPr>
+            <a:xfrm>
+              <a:off x="3516634" y="2301441"/>
               <a:ext cx="49651" cy="49651"/>
             </a:xfrm>
             <a:prstGeom prst="ellipse">
@@ -8614,13 +8743,13 @@
         </p:sp>
         <p:sp>
           <p:nvSpPr>
-            <p:cNvPr id="147" name="pt147"/>
-            <p:cNvSpPr/>
-            <p:nvPr/>
-          </p:nvSpPr>
-          <p:spPr>
-            <a:xfrm>
-              <a:off x="3516634" y="2234022"/>
+            <p:cNvPr id="150" name="pt150"/>
+            <p:cNvSpPr/>
+            <p:nvPr/>
+          </p:nvSpPr>
+          <p:spPr>
+            <a:xfrm>
+              <a:off x="3516634" y="2142483"/>
               <a:ext cx="49651" cy="49651"/>
             </a:xfrm>
             <a:prstGeom prst="ellipse">
@@ -8649,13 +8778,13 @@
         </p:sp>
         <p:sp>
           <p:nvSpPr>
-            <p:cNvPr id="148" name="pt148"/>
-            <p:cNvSpPr/>
-            <p:nvPr/>
-          </p:nvSpPr>
-          <p:spPr>
-            <a:xfrm>
-              <a:off x="3516634" y="2182267"/>
+            <p:cNvPr id="151" name="pt151"/>
+            <p:cNvSpPr/>
+            <p:nvPr/>
+          </p:nvSpPr>
+          <p:spPr>
+            <a:xfrm>
+              <a:off x="3516634" y="2097166"/>
               <a:ext cx="49651" cy="49651"/>
             </a:xfrm>
             <a:prstGeom prst="ellipse">
@@ -8684,13 +8813,13 @@
         </p:sp>
         <p:sp>
           <p:nvSpPr>
-            <p:cNvPr id="149" name="pt149"/>
-            <p:cNvSpPr/>
-            <p:nvPr/>
-          </p:nvSpPr>
-          <p:spPr>
-            <a:xfrm>
-              <a:off x="3772728" y="2213659"/>
+            <p:cNvPr id="152" name="pt152"/>
+            <p:cNvSpPr/>
+            <p:nvPr/>
+          </p:nvSpPr>
+          <p:spPr>
+            <a:xfrm>
+              <a:off x="3772728" y="2223356"/>
               <a:ext cx="49651" cy="49651"/>
             </a:xfrm>
             <a:prstGeom prst="ellipse">
@@ -8719,13 +8848,13 @@
         </p:sp>
         <p:sp>
           <p:nvSpPr>
-            <p:cNvPr id="150" name="pt150"/>
-            <p:cNvSpPr/>
-            <p:nvPr/>
-          </p:nvSpPr>
-          <p:spPr>
-            <a:xfrm>
-              <a:off x="3772728" y="2138147"/>
+            <p:cNvPr id="153" name="pt153"/>
+            <p:cNvSpPr/>
+            <p:nvPr/>
+          </p:nvSpPr>
+          <p:spPr>
+            <a:xfrm>
+              <a:off x="3772728" y="2145969"/>
               <a:ext cx="49651" cy="49651"/>
             </a:xfrm>
             <a:prstGeom prst="ellipse">
@@ -8754,13 +8883,13 @@
         </p:sp>
         <p:sp>
           <p:nvSpPr>
-            <p:cNvPr id="151" name="pt151"/>
-            <p:cNvSpPr/>
-            <p:nvPr/>
-          </p:nvSpPr>
-          <p:spPr>
-            <a:xfrm>
-              <a:off x="3772728" y="2036333"/>
+            <p:cNvPr id="154" name="pt154"/>
+            <p:cNvSpPr/>
+            <p:nvPr/>
+          </p:nvSpPr>
+          <p:spPr>
+            <a:xfrm>
+              <a:off x="3772728" y="2043483"/>
               <a:ext cx="49651" cy="49651"/>
             </a:xfrm>
             <a:prstGeom prst="ellipse">
@@ -8789,13 +8918,13 @@
         </p:sp>
         <p:sp>
           <p:nvSpPr>
-            <p:cNvPr id="152" name="pt152"/>
-            <p:cNvSpPr/>
-            <p:nvPr/>
-          </p:nvSpPr>
-          <p:spPr>
-            <a:xfrm>
-              <a:off x="4028822" y="2069423"/>
+            <p:cNvPr id="155" name="pt155"/>
+            <p:cNvSpPr/>
+            <p:nvPr/>
+          </p:nvSpPr>
+          <p:spPr>
+            <a:xfrm>
+              <a:off x="4028822" y="2069279"/>
               <a:ext cx="49651" cy="49651"/>
             </a:xfrm>
             <a:prstGeom prst="ellipse">
@@ -8824,13 +8953,13 @@
         </p:sp>
         <p:sp>
           <p:nvSpPr>
-            <p:cNvPr id="153" name="pt153"/>
-            <p:cNvSpPr/>
-            <p:nvPr/>
-          </p:nvSpPr>
-          <p:spPr>
-            <a:xfrm>
-              <a:off x="4028822" y="2151723"/>
+            <p:cNvPr id="156" name="pt156"/>
+            <p:cNvSpPr/>
+            <p:nvPr/>
+          </p:nvSpPr>
+          <p:spPr>
+            <a:xfrm>
+              <a:off x="4028822" y="2152244"/>
               <a:ext cx="49651" cy="49651"/>
             </a:xfrm>
             <a:prstGeom prst="ellipse">
@@ -8859,13 +8988,13 @@
         </p:sp>
         <p:sp>
           <p:nvSpPr>
-            <p:cNvPr id="154" name="pt154"/>
-            <p:cNvSpPr/>
-            <p:nvPr/>
-          </p:nvSpPr>
-          <p:spPr>
-            <a:xfrm>
-              <a:off x="4028822" y="2079604"/>
+            <p:cNvPr id="157" name="pt157"/>
+            <p:cNvSpPr/>
+            <p:nvPr/>
+          </p:nvSpPr>
+          <p:spPr>
+            <a:xfrm>
+              <a:off x="4028822" y="2079736"/>
               <a:ext cx="49651" cy="49651"/>
             </a:xfrm>
             <a:prstGeom prst="ellipse">
@@ -8894,13 +9023,13 @@
         </p:sp>
         <p:sp>
           <p:nvSpPr>
-            <p:cNvPr id="155" name="pt155"/>
-            <p:cNvSpPr/>
-            <p:nvPr/>
-          </p:nvSpPr>
-          <p:spPr>
-            <a:xfrm>
-              <a:off x="4284916" y="1780950"/>
+            <p:cNvPr id="158" name="pt158"/>
+            <p:cNvSpPr/>
+            <p:nvPr/>
+          </p:nvSpPr>
+          <p:spPr>
+            <a:xfrm>
+              <a:off x="4284916" y="2059518"/>
               <a:ext cx="49651" cy="49651"/>
             </a:xfrm>
             <a:prstGeom prst="ellipse">
@@ -8929,13 +9058,13 @@
         </p:sp>
         <p:sp>
           <p:nvSpPr>
-            <p:cNvPr id="156" name="pt156"/>
-            <p:cNvSpPr/>
-            <p:nvPr/>
-          </p:nvSpPr>
-          <p:spPr>
-            <a:xfrm>
-              <a:off x="4284916" y="1747012"/>
+            <p:cNvPr id="159" name="pt159"/>
+            <p:cNvSpPr/>
+            <p:nvPr/>
+          </p:nvSpPr>
+          <p:spPr>
+            <a:xfrm>
+              <a:off x="4284916" y="1988405"/>
               <a:ext cx="49651" cy="49651"/>
             </a:xfrm>
             <a:prstGeom prst="ellipse">
@@ -8964,13 +9093,13 @@
         </p:sp>
         <p:sp>
           <p:nvSpPr>
-            <p:cNvPr id="157" name="pt157"/>
-            <p:cNvSpPr/>
-            <p:nvPr/>
-          </p:nvSpPr>
-          <p:spPr>
-            <a:xfrm>
-              <a:off x="4284916" y="1779253"/>
+            <p:cNvPr id="160" name="pt160"/>
+            <p:cNvSpPr/>
+            <p:nvPr/>
+          </p:nvSpPr>
+          <p:spPr>
+            <a:xfrm>
+              <a:off x="4284916" y="2055335"/>
               <a:ext cx="49651" cy="49651"/>
             </a:xfrm>
             <a:prstGeom prst="ellipse">
@@ -8999,13 +9128,13 @@
         </p:sp>
         <p:sp>
           <p:nvSpPr>
-            <p:cNvPr id="158" name="pt158"/>
-            <p:cNvSpPr/>
-            <p:nvPr/>
-          </p:nvSpPr>
-          <p:spPr>
-            <a:xfrm>
-              <a:off x="4541010" y="1795374"/>
+            <p:cNvPr id="161" name="pt161"/>
+            <p:cNvSpPr/>
+            <p:nvPr/>
+          </p:nvSpPr>
+          <p:spPr>
+            <a:xfrm>
+              <a:off x="4541010" y="2081828"/>
               <a:ext cx="49651" cy="49651"/>
             </a:xfrm>
             <a:prstGeom prst="ellipse">
@@ -9034,13 +9163,13 @@
         </p:sp>
         <p:sp>
           <p:nvSpPr>
-            <p:cNvPr id="159" name="pt159"/>
-            <p:cNvSpPr/>
-            <p:nvPr/>
-          </p:nvSpPr>
-          <p:spPr>
-            <a:xfrm>
-              <a:off x="4541010" y="1698650"/>
+            <p:cNvPr id="162" name="pt162"/>
+            <p:cNvSpPr/>
+            <p:nvPr/>
+          </p:nvSpPr>
+          <p:spPr>
+            <a:xfrm>
+              <a:off x="4541010" y="1881039"/>
               <a:ext cx="49651" cy="49651"/>
             </a:xfrm>
             <a:prstGeom prst="ellipse">
@@ -9069,13 +9198,13 @@
         </p:sp>
         <p:sp>
           <p:nvSpPr>
-            <p:cNvPr id="160" name="pt160"/>
-            <p:cNvSpPr/>
-            <p:nvPr/>
-          </p:nvSpPr>
-          <p:spPr>
-            <a:xfrm>
-              <a:off x="4541010" y="1718165"/>
+            <p:cNvPr id="163" name="pt163"/>
+            <p:cNvSpPr/>
+            <p:nvPr/>
+          </p:nvSpPr>
+          <p:spPr>
+            <a:xfrm>
+              <a:off x="4541010" y="1921475"/>
               <a:ext cx="49651" cy="49651"/>
             </a:xfrm>
             <a:prstGeom prst="ellipse">
@@ -9104,7 +9233,7 @@
         </p:sp>
         <p:sp>
           <p:nvSpPr>
-            <p:cNvPr id="161" name="rc161"/>
+            <p:cNvPr id="164" name="rc164"/>
             <p:cNvSpPr/>
             <p:nvPr/>
           </p:nvSpPr>
@@ -9130,13 +9259,13 @@
         </p:sp>
         <p:sp>
           <p:nvSpPr>
-            <p:cNvPr id="162" name="pl162"/>
-            <p:cNvSpPr/>
-            <p:nvPr/>
-          </p:nvSpPr>
-          <p:spPr>
-            <a:xfrm>
-              <a:off x="4789081" y="2614349"/>
+            <p:cNvPr id="165" name="pl165"/>
+            <p:cNvSpPr/>
+            <p:nvPr/>
+          </p:nvSpPr>
+          <p:spPr>
+            <a:xfrm>
+              <a:off x="4789081" y="2599563"/>
               <a:ext cx="1331687" cy="0"/>
             </a:xfrm>
             <a:custGeom>
@@ -9173,13 +9302,13 @@
         </p:sp>
         <p:sp>
           <p:nvSpPr>
-            <p:cNvPr id="163" name="pl163"/>
-            <p:cNvSpPr/>
-            <p:nvPr/>
-          </p:nvSpPr>
-          <p:spPr>
-            <a:xfrm>
-              <a:off x="4789081" y="2402236"/>
+            <p:cNvPr id="166" name="pl166"/>
+            <p:cNvSpPr/>
+            <p:nvPr/>
+          </p:nvSpPr>
+          <p:spPr>
+            <a:xfrm>
+              <a:off x="4789081" y="2425267"/>
               <a:ext cx="1331687" cy="0"/>
             </a:xfrm>
             <a:custGeom>
@@ -9216,13 +9345,13 @@
         </p:sp>
         <p:sp>
           <p:nvSpPr>
-            <p:cNvPr id="164" name="pl164"/>
-            <p:cNvSpPr/>
-            <p:nvPr/>
-          </p:nvSpPr>
-          <p:spPr>
-            <a:xfrm>
-              <a:off x="4789081" y="2190124"/>
+            <p:cNvPr id="167" name="pl167"/>
+            <p:cNvSpPr/>
+            <p:nvPr/>
+          </p:nvSpPr>
+          <p:spPr>
+            <a:xfrm>
+              <a:off x="4789081" y="2250971"/>
               <a:ext cx="1331687" cy="0"/>
             </a:xfrm>
             <a:custGeom>
@@ -9259,13 +9388,13 @@
         </p:sp>
         <p:sp>
           <p:nvSpPr>
-            <p:cNvPr id="165" name="pl165"/>
-            <p:cNvSpPr/>
-            <p:nvPr/>
-          </p:nvSpPr>
-          <p:spPr>
-            <a:xfrm>
-              <a:off x="4789081" y="1978011"/>
+            <p:cNvPr id="168" name="pl168"/>
+            <p:cNvSpPr/>
+            <p:nvPr/>
+          </p:nvSpPr>
+          <p:spPr>
+            <a:xfrm>
+              <a:off x="4789081" y="2076675"/>
               <a:ext cx="1331687" cy="0"/>
             </a:xfrm>
             <a:custGeom>
@@ -9302,13 +9431,13 @@
         </p:sp>
         <p:sp>
           <p:nvSpPr>
-            <p:cNvPr id="166" name="pl166"/>
-            <p:cNvSpPr/>
-            <p:nvPr/>
-          </p:nvSpPr>
-          <p:spPr>
-            <a:xfrm>
-              <a:off x="4789081" y="1765899"/>
+            <p:cNvPr id="169" name="pl169"/>
+            <p:cNvSpPr/>
+            <p:nvPr/>
+          </p:nvSpPr>
+          <p:spPr>
+            <a:xfrm>
+              <a:off x="4789081" y="1902379"/>
               <a:ext cx="1331687" cy="0"/>
             </a:xfrm>
             <a:custGeom>
@@ -9345,13 +9474,13 @@
         </p:sp>
         <p:sp>
           <p:nvSpPr>
-            <p:cNvPr id="167" name="pl167"/>
-            <p:cNvSpPr/>
-            <p:nvPr/>
-          </p:nvSpPr>
-          <p:spPr>
-            <a:xfrm>
-              <a:off x="4789081" y="1553786"/>
+            <p:cNvPr id="170" name="pl170"/>
+            <p:cNvSpPr/>
+            <p:nvPr/>
+          </p:nvSpPr>
+          <p:spPr>
+            <a:xfrm>
+              <a:off x="4789081" y="1728083"/>
               <a:ext cx="1331687" cy="0"/>
             </a:xfrm>
             <a:custGeom>
@@ -9388,13 +9517,13 @@
         </p:sp>
         <p:sp>
           <p:nvSpPr>
-            <p:cNvPr id="168" name="pl168"/>
-            <p:cNvSpPr/>
-            <p:nvPr/>
-          </p:nvSpPr>
-          <p:spPr>
-            <a:xfrm>
-              <a:off x="4789081" y="2402236"/>
+            <p:cNvPr id="171" name="pl171"/>
+            <p:cNvSpPr/>
+            <p:nvPr/>
+          </p:nvSpPr>
+          <p:spPr>
+            <a:xfrm>
+              <a:off x="4789081" y="1553786"/>
               <a:ext cx="1331687" cy="0"/>
             </a:xfrm>
             <a:custGeom>
@@ -9415,135 +9544,178 @@
             </a:custGeom>
             <a:ln w="13550" cap="flat">
               <a:solidFill>
-                <a:srgbClr val="000000">
-                  <a:alpha val="100000"/>
-                </a:srgbClr>
-              </a:solidFill>
-              <a:prstDash val="solid"/>
-              <a:round/>
-            </a:ln>
-          </p:spPr>
-          <p:txBody>
-            <a:bodyPr/>
-            <a:lstStyle/>
-            <a:p/>
-          </p:txBody>
-        </p:sp>
-        <p:sp>
-          <p:nvSpPr>
-            <p:cNvPr id="169" name="pl169"/>
-            <p:cNvSpPr/>
-            <p:nvPr/>
-          </p:nvSpPr>
-          <p:spPr>
-            <a:xfrm>
-              <a:off x="4942737" y="1603845"/>
-              <a:ext cx="256093" cy="43270"/>
+                <a:srgbClr val="BEBEBE">
+                  <a:alpha val="100000"/>
+                </a:srgbClr>
+              </a:solidFill>
+              <a:prstDash val="solid"/>
+              <a:round/>
+            </a:ln>
+          </p:spPr>
+          <p:txBody>
+            <a:bodyPr/>
+            <a:lstStyle/>
+            <a:p/>
+          </p:txBody>
+        </p:sp>
+        <p:sp>
+          <p:nvSpPr>
+            <p:cNvPr id="172" name="pl172"/>
+            <p:cNvSpPr/>
+            <p:nvPr/>
+          </p:nvSpPr>
+          <p:spPr>
+            <a:xfrm>
+              <a:off x="4789081" y="2250971"/>
+              <a:ext cx="1331687" cy="0"/>
             </a:xfrm>
             <a:custGeom>
               <a:avLst/>
               <a:pathLst>
-                <a:path w="256093" h="43270">
+                <a:path w="1331687" h="0">
                   <a:moveTo>
-                    <a:pt x="0" y="43270"/>
+                    <a:pt x="0" y="0"/>
                   </a:moveTo>
                   <a:lnTo>
-                    <a:pt x="256093" y="0"/>
+                    <a:pt x="1331687" y="0"/>
+                  </a:lnTo>
+                  <a:lnTo>
+                    <a:pt x="1331687" y="0"/>
                   </a:lnTo>
                 </a:path>
               </a:pathLst>
             </a:custGeom>
             <a:ln w="13550" cap="flat">
               <a:solidFill>
-                <a:srgbClr val="00BFC4">
-                  <a:alpha val="100000"/>
-                </a:srgbClr>
-              </a:solidFill>
-              <a:prstDash val="solid"/>
-              <a:round/>
-            </a:ln>
-          </p:spPr>
-          <p:txBody>
-            <a:bodyPr/>
-            <a:lstStyle/>
-            <a:p/>
-          </p:txBody>
-        </p:sp>
-        <p:sp>
-          <p:nvSpPr>
-            <p:cNvPr id="170" name="pl170"/>
-            <p:cNvSpPr/>
-            <p:nvPr/>
-          </p:nvSpPr>
-          <p:spPr>
-            <a:xfrm>
-              <a:off x="4942737" y="2011949"/>
-              <a:ext cx="1024375" cy="321562"/>
+                <a:srgbClr val="000000">
+                  <a:alpha val="100000"/>
+                </a:srgbClr>
+              </a:solidFill>
+              <a:prstDash val="solid"/>
+              <a:round/>
+            </a:ln>
+          </p:spPr>
+          <p:txBody>
+            <a:bodyPr/>
+            <a:lstStyle/>
+            <a:p/>
+          </p:txBody>
+        </p:sp>
+        <p:sp>
+          <p:nvSpPr>
+            <p:cNvPr id="173" name="pl173"/>
+            <p:cNvSpPr/>
+            <p:nvPr/>
+          </p:nvSpPr>
+          <p:spPr>
+            <a:xfrm>
+              <a:off x="4942737" y="1604681"/>
+              <a:ext cx="256093" cy="30676"/>
             </a:xfrm>
             <a:custGeom>
               <a:avLst/>
               <a:pathLst>
-                <a:path w="1024375" h="321562">
+                <a:path w="256093" h="30676">
                   <a:moveTo>
-                    <a:pt x="0" y="207870"/>
+                    <a:pt x="0" y="30676"/>
                   </a:moveTo>
                   <a:lnTo>
-                    <a:pt x="256093" y="261322"/>
-                  </a:lnTo>
-                  <a:lnTo>
-                    <a:pt x="512187" y="321562"/>
-                  </a:lnTo>
-                  <a:lnTo>
-                    <a:pt x="768281" y="0"/>
-                  </a:lnTo>
-                  <a:lnTo>
-                    <a:pt x="1024375" y="11878"/>
+                    <a:pt x="256093" y="0"/>
                   </a:lnTo>
                 </a:path>
               </a:pathLst>
             </a:custGeom>
             <a:ln w="13550" cap="flat">
               <a:solidFill>
-                <a:srgbClr val="F8766D">
-                  <a:alpha val="100000"/>
-                </a:srgbClr>
-              </a:solidFill>
-              <a:prstDash val="solid"/>
-              <a:round/>
-            </a:ln>
-          </p:spPr>
-          <p:txBody>
-            <a:bodyPr/>
-            <a:lstStyle/>
-            <a:p/>
-          </p:txBody>
-        </p:sp>
-        <p:sp>
-          <p:nvSpPr>
-            <p:cNvPr id="171" name="pl171"/>
-            <p:cNvSpPr/>
-            <p:nvPr/>
-          </p:nvSpPr>
-          <p:spPr>
-            <a:xfrm>
-              <a:off x="4942737" y="1553786"/>
-              <a:ext cx="256093" cy="37331"/>
+                <a:srgbClr val="00BFC4">
+                  <a:alpha val="100000"/>
+                </a:srgbClr>
+              </a:solidFill>
+              <a:prstDash val="solid"/>
+              <a:round/>
+            </a:ln>
+          </p:spPr>
+          <p:txBody>
+            <a:bodyPr/>
+            <a:lstStyle/>
+            <a:p/>
+          </p:txBody>
+        </p:sp>
+        <p:sp>
+          <p:nvSpPr>
+            <p:cNvPr id="174" name="pl174"/>
+            <p:cNvSpPr/>
+            <p:nvPr/>
+          </p:nvSpPr>
+          <p:spPr>
+            <a:xfrm>
+              <a:off x="4942737" y="2133147"/>
+              <a:ext cx="1024375" cy="397395"/>
             </a:xfrm>
             <a:custGeom>
               <a:avLst/>
               <a:pathLst>
-                <a:path w="256093" h="37331">
+                <a:path w="1024375" h="397395">
                   <a:moveTo>
-                    <a:pt x="0" y="37331"/>
+                    <a:pt x="0" y="0"/>
                   </a:moveTo>
                   <a:lnTo>
-                    <a:pt x="256093" y="0"/>
+                    <a:pt x="256093" y="149894"/>
+                  </a:lnTo>
+                  <a:lnTo>
+                    <a:pt x="512187" y="200789"/>
+                  </a:lnTo>
+                  <a:lnTo>
+                    <a:pt x="768281" y="384845"/>
+                  </a:lnTo>
+                  <a:lnTo>
+                    <a:pt x="1024375" y="397395"/>
                   </a:lnTo>
                 </a:path>
               </a:pathLst>
             </a:custGeom>
             <a:ln w="13550" cap="flat">
               <a:solidFill>
+                <a:srgbClr val="F8766D">
+                  <a:alpha val="100000"/>
+                </a:srgbClr>
+              </a:solidFill>
+              <a:prstDash val="solid"/>
+              <a:round/>
+            </a:ln>
+          </p:spPr>
+          <p:txBody>
+            <a:bodyPr/>
+            <a:lstStyle/>
+            <a:p/>
+          </p:txBody>
+        </p:sp>
+        <p:sp>
+          <p:nvSpPr>
+            <p:cNvPr id="175" name="pl175"/>
+            <p:cNvSpPr/>
+            <p:nvPr/>
+          </p:nvSpPr>
+          <p:spPr>
+            <a:xfrm>
+              <a:off x="4942737" y="1553786"/>
+              <a:ext cx="256093" cy="32070"/>
+            </a:xfrm>
+            <a:custGeom>
+              <a:avLst/>
+              <a:pathLst>
+                <a:path w="256093" h="32070">
+                  <a:moveTo>
+                    <a:pt x="0" y="32070"/>
+                  </a:moveTo>
+                  <a:lnTo>
+                    <a:pt x="256093" y="0"/>
+                  </a:lnTo>
+                </a:path>
+              </a:pathLst>
+            </a:custGeom>
+            <a:ln w="13550" cap="flat">
+              <a:solidFill>
                 <a:srgbClr val="7CAE00">
                   <a:alpha val="100000"/>
                 </a:srgbClr>
@@ -9560,13 +9732,13 @@
         </p:sp>
         <p:sp>
           <p:nvSpPr>
-            <p:cNvPr id="172" name="pt172"/>
-            <p:cNvSpPr/>
-            <p:nvPr/>
-          </p:nvSpPr>
-          <p:spPr>
-            <a:xfrm>
-              <a:off x="4917911" y="2194994"/>
+            <p:cNvPr id="176" name="pt176"/>
+            <p:cNvSpPr/>
+            <p:nvPr/>
+          </p:nvSpPr>
+          <p:spPr>
+            <a:xfrm>
+              <a:off x="4917911" y="2108321"/>
               <a:ext cx="49651" cy="49651"/>
             </a:xfrm>
             <a:prstGeom prst="ellipse">
@@ -9595,13 +9767,13 @@
         </p:sp>
         <p:sp>
           <p:nvSpPr>
-            <p:cNvPr id="173" name="pt173"/>
-            <p:cNvSpPr/>
-            <p:nvPr/>
-          </p:nvSpPr>
-          <p:spPr>
-            <a:xfrm>
-              <a:off x="4917911" y="1566292"/>
+            <p:cNvPr id="177" name="pt177"/>
+            <p:cNvSpPr/>
+            <p:nvPr/>
+          </p:nvSpPr>
+          <p:spPr>
+            <a:xfrm>
+              <a:off x="4917911" y="1561031"/>
               <a:ext cx="49651" cy="49651"/>
             </a:xfrm>
             <a:prstGeom prst="ellipse">
@@ -9630,13 +9802,13 @@
         </p:sp>
         <p:sp>
           <p:nvSpPr>
-            <p:cNvPr id="174" name="pt174"/>
-            <p:cNvSpPr/>
-            <p:nvPr/>
-          </p:nvSpPr>
-          <p:spPr>
-            <a:xfrm>
-              <a:off x="4917911" y="1622290"/>
+            <p:cNvPr id="178" name="pt178"/>
+            <p:cNvSpPr/>
+            <p:nvPr/>
+          </p:nvSpPr>
+          <p:spPr>
+            <a:xfrm>
+              <a:off x="4917911" y="1610531"/>
               <a:ext cx="49651" cy="49651"/>
             </a:xfrm>
             <a:prstGeom prst="ellipse">
@@ -9665,13 +9837,13 @@
         </p:sp>
         <p:sp>
           <p:nvSpPr>
-            <p:cNvPr id="175" name="pt175"/>
-            <p:cNvSpPr/>
-            <p:nvPr/>
-          </p:nvSpPr>
-          <p:spPr>
-            <a:xfrm>
-              <a:off x="5174005" y="2248446"/>
+            <p:cNvPr id="179" name="pt179"/>
+            <p:cNvSpPr/>
+            <p:nvPr/>
+          </p:nvSpPr>
+          <p:spPr>
+            <a:xfrm>
+              <a:off x="5174005" y="2258216"/>
               <a:ext cx="49651" cy="49651"/>
             </a:xfrm>
             <a:prstGeom prst="ellipse">
@@ -9700,7 +9872,7 @@
         </p:sp>
         <p:sp>
           <p:nvSpPr>
-            <p:cNvPr id="176" name="pt176"/>
+            <p:cNvPr id="180" name="pt180"/>
             <p:cNvSpPr/>
             <p:nvPr/>
           </p:nvSpPr>
@@ -9735,13 +9907,13 @@
         </p:sp>
         <p:sp>
           <p:nvSpPr>
-            <p:cNvPr id="177" name="pt177"/>
-            <p:cNvSpPr/>
-            <p:nvPr/>
-          </p:nvSpPr>
-          <p:spPr>
-            <a:xfrm>
-              <a:off x="5174005" y="1579019"/>
+            <p:cNvPr id="181" name="pt181"/>
+            <p:cNvSpPr/>
+            <p:nvPr/>
+          </p:nvSpPr>
+          <p:spPr>
+            <a:xfrm>
+              <a:off x="5174005" y="1579855"/>
               <a:ext cx="49651" cy="49651"/>
             </a:xfrm>
             <a:prstGeom prst="ellipse">
@@ -9770,13 +9942,13 @@
         </p:sp>
         <p:sp>
           <p:nvSpPr>
-            <p:cNvPr id="178" name="pt178"/>
-            <p:cNvSpPr/>
-            <p:nvPr/>
-          </p:nvSpPr>
-          <p:spPr>
-            <a:xfrm>
-              <a:off x="5430099" y="2308686"/>
+            <p:cNvPr id="182" name="pt182"/>
+            <p:cNvSpPr/>
+            <p:nvPr/>
+          </p:nvSpPr>
+          <p:spPr>
+            <a:xfrm>
+              <a:off x="5430099" y="2309110"/>
               <a:ext cx="49651" cy="49651"/>
             </a:xfrm>
             <a:prstGeom prst="ellipse">
@@ -9805,13 +9977,13 @@
         </p:sp>
         <p:sp>
           <p:nvSpPr>
-            <p:cNvPr id="179" name="pt179"/>
-            <p:cNvSpPr/>
-            <p:nvPr/>
-          </p:nvSpPr>
-          <p:spPr>
-            <a:xfrm>
-              <a:off x="5686193" y="1987123"/>
+            <p:cNvPr id="183" name="pt183"/>
+            <p:cNvSpPr/>
+            <p:nvPr/>
+          </p:nvSpPr>
+          <p:spPr>
+            <a:xfrm>
+              <a:off x="5686193" y="2493167"/>
               <a:ext cx="49651" cy="49651"/>
             </a:xfrm>
             <a:prstGeom prst="ellipse">
@@ -9840,13 +10012,13 @@
         </p:sp>
         <p:sp>
           <p:nvSpPr>
-            <p:cNvPr id="180" name="pt180"/>
-            <p:cNvSpPr/>
-            <p:nvPr/>
-          </p:nvSpPr>
-          <p:spPr>
-            <a:xfrm>
-              <a:off x="5942287" y="1999002"/>
+            <p:cNvPr id="184" name="pt184"/>
+            <p:cNvSpPr/>
+            <p:nvPr/>
+          </p:nvSpPr>
+          <p:spPr>
+            <a:xfrm>
+              <a:off x="5942287" y="2505716"/>
               <a:ext cx="49651" cy="49651"/>
             </a:xfrm>
             <a:prstGeom prst="ellipse">
@@ -9875,7 +10047,7 @@
         </p:sp>
         <p:sp>
           <p:nvSpPr>
-            <p:cNvPr id="181" name="rc181"/>
+            <p:cNvPr id="185" name="rc185"/>
             <p:cNvSpPr/>
             <p:nvPr/>
           </p:nvSpPr>
@@ -9910,7 +10082,7 @@
         </p:sp>
         <p:sp>
           <p:nvSpPr>
-            <p:cNvPr id="182" name="tx182"/>
+            <p:cNvPr id="186" name="tx186"/>
             <p:cNvSpPr/>
             <p:nvPr/>
           </p:nvSpPr>
@@ -9956,7 +10128,7 @@
         </p:sp>
         <p:sp>
           <p:nvSpPr>
-            <p:cNvPr id="183" name="rc183"/>
+            <p:cNvPr id="187" name="rc187"/>
             <p:cNvSpPr/>
             <p:nvPr/>
           </p:nvSpPr>
@@ -9991,7 +10163,7 @@
         </p:sp>
         <p:sp>
           <p:nvSpPr>
-            <p:cNvPr id="184" name="tx184"/>
+            <p:cNvPr id="188" name="tx188"/>
             <p:cNvSpPr/>
             <p:nvPr/>
           </p:nvSpPr>
@@ -10037,7 +10209,7 @@
         </p:sp>
         <p:sp>
           <p:nvSpPr>
-            <p:cNvPr id="185" name="rc185"/>
+            <p:cNvPr id="189" name="rc189"/>
             <p:cNvSpPr/>
             <p:nvPr/>
           </p:nvSpPr>
@@ -10072,7 +10244,7 @@
         </p:sp>
         <p:sp>
           <p:nvSpPr>
-            <p:cNvPr id="186" name="tx186"/>
+            <p:cNvPr id="190" name="tx190"/>
             <p:cNvSpPr/>
             <p:nvPr/>
           </p:nvSpPr>
@@ -10118,7 +10290,7 @@
         </p:sp>
         <p:sp>
           <p:nvSpPr>
-            <p:cNvPr id="187" name="rc187"/>
+            <p:cNvPr id="191" name="rc191"/>
             <p:cNvSpPr/>
             <p:nvPr/>
           </p:nvSpPr>
@@ -10153,7 +10325,7 @@
         </p:sp>
         <p:sp>
           <p:nvSpPr>
-            <p:cNvPr id="188" name="tx188"/>
+            <p:cNvPr id="192" name="tx192"/>
             <p:cNvSpPr/>
             <p:nvPr/>
           </p:nvSpPr>
@@ -10199,7 +10371,7 @@
         </p:sp>
         <p:sp>
           <p:nvSpPr>
-            <p:cNvPr id="189" name="rc189"/>
+            <p:cNvPr id="193" name="rc193"/>
             <p:cNvSpPr/>
             <p:nvPr/>
           </p:nvSpPr>
@@ -10234,7 +10406,7 @@
         </p:sp>
         <p:sp>
           <p:nvSpPr>
-            <p:cNvPr id="190" name="tx190"/>
+            <p:cNvPr id="194" name="tx194"/>
             <p:cNvSpPr/>
             <p:nvPr/>
           </p:nvSpPr>
@@ -10280,7 +10452,7 @@
         </p:sp>
         <p:sp>
           <p:nvSpPr>
-            <p:cNvPr id="191" name="rc191"/>
+            <p:cNvPr id="195" name="rc195"/>
             <p:cNvSpPr/>
             <p:nvPr/>
           </p:nvSpPr>
@@ -10315,7 +10487,7 @@
         </p:sp>
         <p:sp>
           <p:nvSpPr>
-            <p:cNvPr id="192" name="tx192"/>
+            <p:cNvPr id="196" name="tx196"/>
             <p:cNvSpPr/>
             <p:nvPr/>
           </p:nvSpPr>
@@ -10361,7 +10533,7 @@
         </p:sp>
         <p:sp>
           <p:nvSpPr>
-            <p:cNvPr id="193" name="pl193"/>
+            <p:cNvPr id="197" name="pl197"/>
             <p:cNvSpPr/>
             <p:nvPr/>
           </p:nvSpPr>
@@ -10401,7 +10573,7 @@
         </p:sp>
         <p:sp>
           <p:nvSpPr>
-            <p:cNvPr id="194" name="pl194"/>
+            <p:cNvPr id="198" name="pl198"/>
             <p:cNvSpPr/>
             <p:nvPr/>
           </p:nvSpPr>
@@ -10441,7 +10613,7 @@
         </p:sp>
         <p:sp>
           <p:nvSpPr>
-            <p:cNvPr id="195" name="pl195"/>
+            <p:cNvPr id="199" name="pl199"/>
             <p:cNvSpPr/>
             <p:nvPr/>
           </p:nvSpPr>
@@ -10481,7 +10653,7 @@
         </p:sp>
         <p:sp>
           <p:nvSpPr>
-            <p:cNvPr id="196" name="pl196"/>
+            <p:cNvPr id="200" name="pl200"/>
             <p:cNvSpPr/>
             <p:nvPr/>
           </p:nvSpPr>
@@ -10521,7 +10693,7 @@
         </p:sp>
         <p:sp>
           <p:nvSpPr>
-            <p:cNvPr id="197" name="pl197"/>
+            <p:cNvPr id="201" name="pl201"/>
             <p:cNvSpPr/>
             <p:nvPr/>
           </p:nvSpPr>
@@ -10561,7 +10733,7 @@
         </p:sp>
         <p:sp>
           <p:nvSpPr>
-            <p:cNvPr id="198" name="pl198"/>
+            <p:cNvPr id="202" name="pl202"/>
             <p:cNvSpPr/>
             <p:nvPr/>
           </p:nvSpPr>
@@ -10601,7 +10773,7 @@
         </p:sp>
         <p:sp>
           <p:nvSpPr>
-            <p:cNvPr id="199" name="tx199"/>
+            <p:cNvPr id="203" name="tx203"/>
             <p:cNvSpPr/>
             <p:nvPr/>
           </p:nvSpPr>
@@ -10647,7 +10819,7 @@
         </p:sp>
         <p:sp>
           <p:nvSpPr>
-            <p:cNvPr id="200" name="tx200"/>
+            <p:cNvPr id="204" name="tx204"/>
             <p:cNvSpPr/>
             <p:nvPr/>
           </p:nvSpPr>
@@ -10693,7 +10865,7 @@
         </p:sp>
         <p:sp>
           <p:nvSpPr>
-            <p:cNvPr id="201" name="tx201"/>
+            <p:cNvPr id="205" name="tx205"/>
             <p:cNvSpPr/>
             <p:nvPr/>
           </p:nvSpPr>
@@ -10739,7 +10911,7 @@
         </p:sp>
         <p:sp>
           <p:nvSpPr>
-            <p:cNvPr id="202" name="tx202"/>
+            <p:cNvPr id="206" name="tx206"/>
             <p:cNvSpPr/>
             <p:nvPr/>
           </p:nvSpPr>
@@ -10785,7 +10957,7 @@
         </p:sp>
         <p:sp>
           <p:nvSpPr>
-            <p:cNvPr id="203" name="tx203"/>
+            <p:cNvPr id="207" name="tx207"/>
             <p:cNvSpPr/>
             <p:nvPr/>
           </p:nvSpPr>
@@ -10831,7 +11003,7 @@
         </p:sp>
         <p:sp>
           <p:nvSpPr>
-            <p:cNvPr id="204" name="pl204"/>
+            <p:cNvPr id="208" name="pl208"/>
             <p:cNvSpPr/>
             <p:nvPr/>
           </p:nvSpPr>
@@ -10871,7 +11043,7 @@
         </p:sp>
         <p:sp>
           <p:nvSpPr>
-            <p:cNvPr id="205" name="pl205"/>
+            <p:cNvPr id="209" name="pl209"/>
             <p:cNvSpPr/>
             <p:nvPr/>
           </p:nvSpPr>
@@ -10911,7 +11083,7 @@
         </p:sp>
         <p:sp>
           <p:nvSpPr>
-            <p:cNvPr id="206" name="pl206"/>
+            <p:cNvPr id="210" name="pl210"/>
             <p:cNvSpPr/>
             <p:nvPr/>
           </p:nvSpPr>
@@ -10951,7 +11123,7 @@
         </p:sp>
         <p:sp>
           <p:nvSpPr>
-            <p:cNvPr id="207" name="pl207"/>
+            <p:cNvPr id="211" name="pl211"/>
             <p:cNvSpPr/>
             <p:nvPr/>
           </p:nvSpPr>
@@ -10991,7 +11163,7 @@
         </p:sp>
         <p:sp>
           <p:nvSpPr>
-            <p:cNvPr id="208" name="pl208"/>
+            <p:cNvPr id="212" name="pl212"/>
             <p:cNvSpPr/>
             <p:nvPr/>
           </p:nvSpPr>
@@ -11031,7 +11203,7 @@
         </p:sp>
         <p:sp>
           <p:nvSpPr>
-            <p:cNvPr id="209" name="pl209"/>
+            <p:cNvPr id="213" name="pl213"/>
             <p:cNvSpPr/>
             <p:nvPr/>
           </p:nvSpPr>
@@ -11071,7 +11243,7 @@
         </p:sp>
         <p:sp>
           <p:nvSpPr>
-            <p:cNvPr id="210" name="tx210"/>
+            <p:cNvPr id="214" name="tx214"/>
             <p:cNvSpPr/>
             <p:nvPr/>
           </p:nvSpPr>
@@ -11117,7 +11289,7 @@
         </p:sp>
         <p:sp>
           <p:nvSpPr>
-            <p:cNvPr id="211" name="tx211"/>
+            <p:cNvPr id="215" name="tx215"/>
             <p:cNvSpPr/>
             <p:nvPr/>
           </p:nvSpPr>
@@ -11163,7 +11335,7 @@
         </p:sp>
         <p:sp>
           <p:nvSpPr>
-            <p:cNvPr id="212" name="tx212"/>
+            <p:cNvPr id="216" name="tx216"/>
             <p:cNvSpPr/>
             <p:nvPr/>
           </p:nvSpPr>
@@ -11209,7 +11381,7 @@
         </p:sp>
         <p:sp>
           <p:nvSpPr>
-            <p:cNvPr id="213" name="tx213"/>
+            <p:cNvPr id="217" name="tx217"/>
             <p:cNvSpPr/>
             <p:nvPr/>
           </p:nvSpPr>
@@ -11255,7 +11427,7 @@
         </p:sp>
         <p:sp>
           <p:nvSpPr>
-            <p:cNvPr id="214" name="tx214"/>
+            <p:cNvPr id="218" name="tx218"/>
             <p:cNvSpPr/>
             <p:nvPr/>
           </p:nvSpPr>
@@ -11301,7 +11473,7 @@
         </p:sp>
         <p:sp>
           <p:nvSpPr>
-            <p:cNvPr id="215" name="pl215"/>
+            <p:cNvPr id="219" name="pl219"/>
             <p:cNvSpPr/>
             <p:nvPr/>
           </p:nvSpPr>
@@ -11341,7 +11513,7 @@
         </p:sp>
         <p:sp>
           <p:nvSpPr>
-            <p:cNvPr id="216" name="pl216"/>
+            <p:cNvPr id="220" name="pl220"/>
             <p:cNvSpPr/>
             <p:nvPr/>
           </p:nvSpPr>
@@ -11381,7 +11553,7 @@
         </p:sp>
         <p:sp>
           <p:nvSpPr>
-            <p:cNvPr id="217" name="pl217"/>
+            <p:cNvPr id="221" name="pl221"/>
             <p:cNvSpPr/>
             <p:nvPr/>
           </p:nvSpPr>
@@ -11421,7 +11593,7 @@
         </p:sp>
         <p:sp>
           <p:nvSpPr>
-            <p:cNvPr id="218" name="pl218"/>
+            <p:cNvPr id="222" name="pl222"/>
             <p:cNvSpPr/>
             <p:nvPr/>
           </p:nvSpPr>
@@ -11461,7 +11633,7 @@
         </p:sp>
         <p:sp>
           <p:nvSpPr>
-            <p:cNvPr id="219" name="pl219"/>
+            <p:cNvPr id="223" name="pl223"/>
             <p:cNvSpPr/>
             <p:nvPr/>
           </p:nvSpPr>
@@ -11501,7 +11673,7 @@
         </p:sp>
         <p:sp>
           <p:nvSpPr>
-            <p:cNvPr id="220" name="pl220"/>
+            <p:cNvPr id="224" name="pl224"/>
             <p:cNvSpPr/>
             <p:nvPr/>
           </p:nvSpPr>
@@ -11541,7 +11713,7 @@
         </p:sp>
         <p:sp>
           <p:nvSpPr>
-            <p:cNvPr id="221" name="tx221"/>
+            <p:cNvPr id="225" name="tx225"/>
             <p:cNvSpPr/>
             <p:nvPr/>
           </p:nvSpPr>
@@ -11587,7 +11759,7 @@
         </p:sp>
         <p:sp>
           <p:nvSpPr>
-            <p:cNvPr id="222" name="tx222"/>
+            <p:cNvPr id="226" name="tx226"/>
             <p:cNvSpPr/>
             <p:nvPr/>
           </p:nvSpPr>
@@ -11633,7 +11805,7 @@
         </p:sp>
         <p:sp>
           <p:nvSpPr>
-            <p:cNvPr id="223" name="tx223"/>
+            <p:cNvPr id="227" name="tx227"/>
             <p:cNvSpPr/>
             <p:nvPr/>
           </p:nvSpPr>
@@ -11679,7 +11851,7 @@
         </p:sp>
         <p:sp>
           <p:nvSpPr>
-            <p:cNvPr id="224" name="tx224"/>
+            <p:cNvPr id="228" name="tx228"/>
             <p:cNvSpPr/>
             <p:nvPr/>
           </p:nvSpPr>
@@ -11725,7 +11897,7 @@
         </p:sp>
         <p:sp>
           <p:nvSpPr>
-            <p:cNvPr id="225" name="tx225"/>
+            <p:cNvPr id="229" name="tx229"/>
             <p:cNvSpPr/>
             <p:nvPr/>
           </p:nvSpPr>
@@ -11771,7 +11943,7 @@
         </p:sp>
         <p:sp>
           <p:nvSpPr>
-            <p:cNvPr id="226" name="pl226"/>
+            <p:cNvPr id="230" name="pl230"/>
             <p:cNvSpPr/>
             <p:nvPr/>
           </p:nvSpPr>
@@ -11811,7 +11983,7 @@
         </p:sp>
         <p:sp>
           <p:nvSpPr>
-            <p:cNvPr id="227" name="pl227"/>
+            <p:cNvPr id="231" name="pl231"/>
             <p:cNvSpPr/>
             <p:nvPr/>
           </p:nvSpPr>
@@ -11851,7 +12023,7 @@
         </p:sp>
         <p:sp>
           <p:nvSpPr>
-            <p:cNvPr id="228" name="pl228"/>
+            <p:cNvPr id="232" name="pl232"/>
             <p:cNvSpPr/>
             <p:nvPr/>
           </p:nvSpPr>
@@ -11891,7 +12063,7 @@
         </p:sp>
         <p:sp>
           <p:nvSpPr>
-            <p:cNvPr id="229" name="pl229"/>
+            <p:cNvPr id="233" name="pl233"/>
             <p:cNvSpPr/>
             <p:nvPr/>
           </p:nvSpPr>
@@ -11931,7 +12103,7 @@
         </p:sp>
         <p:sp>
           <p:nvSpPr>
-            <p:cNvPr id="230" name="pl230"/>
+            <p:cNvPr id="234" name="pl234"/>
             <p:cNvSpPr/>
             <p:nvPr/>
           </p:nvSpPr>
@@ -11971,7 +12143,7 @@
         </p:sp>
         <p:sp>
           <p:nvSpPr>
-            <p:cNvPr id="231" name="pl231"/>
+            <p:cNvPr id="235" name="pl235"/>
             <p:cNvSpPr/>
             <p:nvPr/>
           </p:nvSpPr>
@@ -12011,7 +12183,7 @@
         </p:sp>
         <p:sp>
           <p:nvSpPr>
-            <p:cNvPr id="232" name="tx232"/>
+            <p:cNvPr id="236" name="tx236"/>
             <p:cNvSpPr/>
             <p:nvPr/>
           </p:nvSpPr>
@@ -12057,7 +12229,7 @@
         </p:sp>
         <p:sp>
           <p:nvSpPr>
-            <p:cNvPr id="233" name="tx233"/>
+            <p:cNvPr id="237" name="tx237"/>
             <p:cNvSpPr/>
             <p:nvPr/>
           </p:nvSpPr>
@@ -12103,7 +12275,7 @@
         </p:sp>
         <p:sp>
           <p:nvSpPr>
-            <p:cNvPr id="234" name="tx234"/>
+            <p:cNvPr id="238" name="tx238"/>
             <p:cNvSpPr/>
             <p:nvPr/>
           </p:nvSpPr>
@@ -12149,7 +12321,7 @@
         </p:sp>
         <p:sp>
           <p:nvSpPr>
-            <p:cNvPr id="235" name="tx235"/>
+            <p:cNvPr id="239" name="tx239"/>
             <p:cNvSpPr/>
             <p:nvPr/>
           </p:nvSpPr>
@@ -12195,7 +12367,7 @@
         </p:sp>
         <p:sp>
           <p:nvSpPr>
-            <p:cNvPr id="236" name="tx236"/>
+            <p:cNvPr id="240" name="tx240"/>
             <p:cNvSpPr/>
             <p:nvPr/>
           </p:nvSpPr>
@@ -12241,7 +12413,7 @@
         </p:sp>
         <p:sp>
           <p:nvSpPr>
-            <p:cNvPr id="237" name="pl237"/>
+            <p:cNvPr id="241" name="pl241"/>
             <p:cNvSpPr/>
             <p:nvPr/>
           </p:nvSpPr>
@@ -12281,7 +12453,7 @@
         </p:sp>
         <p:sp>
           <p:nvSpPr>
-            <p:cNvPr id="238" name="tx238"/>
+            <p:cNvPr id="242" name="tx242"/>
             <p:cNvSpPr/>
             <p:nvPr/>
           </p:nvSpPr>
@@ -12327,7 +12499,7 @@
         </p:sp>
         <p:sp>
           <p:nvSpPr>
-            <p:cNvPr id="239" name="tx239"/>
+            <p:cNvPr id="243" name="tx243"/>
             <p:cNvSpPr/>
             <p:nvPr/>
           </p:nvSpPr>
@@ -12373,7 +12545,7 @@
         </p:sp>
         <p:sp>
           <p:nvSpPr>
-            <p:cNvPr id="240" name="tx240"/>
+            <p:cNvPr id="244" name="tx244"/>
             <p:cNvSpPr/>
             <p:nvPr/>
           </p:nvSpPr>
@@ -12419,7 +12591,7 @@
         </p:sp>
         <p:sp>
           <p:nvSpPr>
-            <p:cNvPr id="241" name="tx241"/>
+            <p:cNvPr id="245" name="tx245"/>
             <p:cNvSpPr/>
             <p:nvPr/>
           </p:nvSpPr>
@@ -12465,7 +12637,7 @@
         </p:sp>
         <p:sp>
           <p:nvSpPr>
-            <p:cNvPr id="242" name="tx242"/>
+            <p:cNvPr id="246" name="tx246"/>
             <p:cNvSpPr/>
             <p:nvPr/>
           </p:nvSpPr>
@@ -12511,7 +12683,7 @@
         </p:sp>
         <p:sp>
           <p:nvSpPr>
-            <p:cNvPr id="243" name="tx243"/>
+            <p:cNvPr id="247" name="tx247"/>
             <p:cNvSpPr/>
             <p:nvPr/>
           </p:nvSpPr>
@@ -12557,7 +12729,7 @@
         </p:sp>
         <p:sp>
           <p:nvSpPr>
-            <p:cNvPr id="244" name="tx244"/>
+            <p:cNvPr id="248" name="tx248"/>
             <p:cNvSpPr/>
             <p:nvPr/>
           </p:nvSpPr>
@@ -12603,7 +12775,7 @@
         </p:sp>
         <p:sp>
           <p:nvSpPr>
-            <p:cNvPr id="245" name="pl245"/>
+            <p:cNvPr id="249" name="pl249"/>
             <p:cNvSpPr/>
             <p:nvPr/>
           </p:nvSpPr>
@@ -12643,7 +12815,7 @@
         </p:sp>
         <p:sp>
           <p:nvSpPr>
-            <p:cNvPr id="246" name="pl246"/>
+            <p:cNvPr id="250" name="pl250"/>
             <p:cNvSpPr/>
             <p:nvPr/>
           </p:nvSpPr>
@@ -12683,7 +12855,7 @@
         </p:sp>
         <p:sp>
           <p:nvSpPr>
-            <p:cNvPr id="247" name="pl247"/>
+            <p:cNvPr id="251" name="pl251"/>
             <p:cNvSpPr/>
             <p:nvPr/>
           </p:nvSpPr>
@@ -12723,7 +12895,7 @@
         </p:sp>
         <p:sp>
           <p:nvSpPr>
-            <p:cNvPr id="248" name="pl248"/>
+            <p:cNvPr id="252" name="pl252"/>
             <p:cNvSpPr/>
             <p:nvPr/>
           </p:nvSpPr>
@@ -12763,7 +12935,7 @@
         </p:sp>
         <p:sp>
           <p:nvSpPr>
-            <p:cNvPr id="249" name="pl249"/>
+            <p:cNvPr id="253" name="pl253"/>
             <p:cNvSpPr/>
             <p:nvPr/>
           </p:nvSpPr>
@@ -12803,7 +12975,7 @@
         </p:sp>
         <p:sp>
           <p:nvSpPr>
-            <p:cNvPr id="250" name="pl250"/>
+            <p:cNvPr id="254" name="pl254"/>
             <p:cNvSpPr/>
             <p:nvPr/>
           </p:nvSpPr>
@@ -12843,7 +13015,7 @@
         </p:sp>
         <p:sp>
           <p:nvSpPr>
-            <p:cNvPr id="251" name="pl251"/>
+            <p:cNvPr id="255" name="pl255"/>
             <p:cNvSpPr/>
             <p:nvPr/>
           </p:nvSpPr>
@@ -12883,7 +13055,7 @@
         </p:sp>
         <p:sp>
           <p:nvSpPr>
-            <p:cNvPr id="252" name="pl252"/>
+            <p:cNvPr id="256" name="pl256"/>
             <p:cNvSpPr/>
             <p:nvPr/>
           </p:nvSpPr>
@@ -12923,13 +13095,59 @@
         </p:sp>
         <p:sp>
           <p:nvSpPr>
-            <p:cNvPr id="253" name="tx253"/>
-            <p:cNvSpPr/>
-            <p:nvPr/>
-          </p:nvSpPr>
-          <p:spPr>
-            <a:xfrm>
-              <a:off x="258539" y="2568807"/>
+            <p:cNvPr id="257" name="tx257"/>
+            <p:cNvSpPr/>
+            <p:nvPr/>
+          </p:nvSpPr>
+          <p:spPr>
+            <a:xfrm>
+              <a:off x="258539" y="2554022"/>
+              <a:ext cx="264080" cy="85903"/>
+            </a:xfrm>
+            <a:prstGeom prst="rect">
+              <a:avLst/>
+            </a:prstGeom>
+            <a:noFill/>
+          </p:spPr>
+          <p:txBody>
+            <a:bodyPr lIns="0" rIns="0" tIns="0" bIns="0" anchorCtr="1" anchor="ctr" wrap="none"/>
+            <a:lstStyle/>
+            <a:p>
+              <a:pPr algn="l" marL="0" marR="0" indent="0">
+                <a:lnSpc>
+                  <a:spcPts val="960"/>
+                </a:lnSpc>
+                <a:spcBef>
+                  <a:spcPts val="0"/>
+                </a:spcBef>
+                <a:spcAft>
+                  <a:spcPts val="0"/>
+                </a:spcAft>
+              </a:pPr>
+              <a:r>
+                <a:rPr sz="960">
+                  <a:solidFill>
+                    <a:srgbClr val="4D4D4D">
+                      <a:alpha val="100000"/>
+                    </a:srgbClr>
+                  </a:solidFill>
+                  <a:latin typeface="Times New Roman"/>
+                  <a:cs typeface="Times New Roman"/>
+                </a:rPr>
+                <a:t>-50%</a:t>
+              </a:r>
+            </a:p>
+          </p:txBody>
+        </p:sp>
+        <p:sp>
+          <p:nvSpPr>
+            <p:cNvPr id="258" name="tx258"/>
+            <p:cNvSpPr/>
+            <p:nvPr/>
+          </p:nvSpPr>
+          <p:spPr>
+            <a:xfrm>
+              <a:off x="258539" y="2379726"/>
               <a:ext cx="264080" cy="85903"/>
             </a:xfrm>
             <a:prstGeom prst="rect">
@@ -12969,13 +13187,13 @@
         </p:sp>
         <p:sp>
           <p:nvSpPr>
-            <p:cNvPr id="254" name="tx254"/>
-            <p:cNvSpPr/>
-            <p:nvPr/>
-          </p:nvSpPr>
-          <p:spPr>
-            <a:xfrm>
-              <a:off x="360100" y="2356695"/>
+            <p:cNvPr id="259" name="tx259"/>
+            <p:cNvSpPr/>
+            <p:nvPr/>
+          </p:nvSpPr>
+          <p:spPr>
+            <a:xfrm>
+              <a:off x="360100" y="2205430"/>
               <a:ext cx="162520" cy="85903"/>
             </a:xfrm>
             <a:prstGeom prst="rect">
@@ -13015,13 +13233,13 @@
         </p:sp>
         <p:sp>
           <p:nvSpPr>
-            <p:cNvPr id="255" name="tx255"/>
-            <p:cNvSpPr/>
-            <p:nvPr/>
-          </p:nvSpPr>
-          <p:spPr>
-            <a:xfrm>
-              <a:off x="299140" y="2144582"/>
+            <p:cNvPr id="260" name="tx260"/>
+            <p:cNvSpPr/>
+            <p:nvPr/>
+          </p:nvSpPr>
+          <p:spPr>
+            <a:xfrm>
+              <a:off x="299140" y="2031134"/>
               <a:ext cx="223480" cy="85903"/>
             </a:xfrm>
             <a:prstGeom prst="rect">
@@ -13061,13 +13279,13 @@
         </p:sp>
         <p:sp>
           <p:nvSpPr>
-            <p:cNvPr id="256" name="tx256"/>
-            <p:cNvSpPr/>
-            <p:nvPr/>
-          </p:nvSpPr>
-          <p:spPr>
-            <a:xfrm>
-              <a:off x="299140" y="1932470"/>
+            <p:cNvPr id="261" name="tx261"/>
+            <p:cNvSpPr/>
+            <p:nvPr/>
+          </p:nvSpPr>
+          <p:spPr>
+            <a:xfrm>
+              <a:off x="299140" y="1856837"/>
               <a:ext cx="223480" cy="85903"/>
             </a:xfrm>
             <a:prstGeom prst="rect">
@@ -13107,13 +13325,13 @@
         </p:sp>
         <p:sp>
           <p:nvSpPr>
-            <p:cNvPr id="257" name="tx257"/>
-            <p:cNvSpPr/>
-            <p:nvPr/>
-          </p:nvSpPr>
-          <p:spPr>
-            <a:xfrm>
-              <a:off x="299140" y="1720358"/>
+            <p:cNvPr id="262" name="tx262"/>
+            <p:cNvSpPr/>
+            <p:nvPr/>
+          </p:nvSpPr>
+          <p:spPr>
+            <a:xfrm>
+              <a:off x="299140" y="1682541"/>
               <a:ext cx="223480" cy="85903"/>
             </a:xfrm>
             <a:prstGeom prst="rect">
@@ -13153,7 +13371,7 @@
         </p:sp>
         <p:sp>
           <p:nvSpPr>
-            <p:cNvPr id="258" name="tx258"/>
+            <p:cNvPr id="263" name="tx263"/>
             <p:cNvSpPr/>
             <p:nvPr/>
           </p:nvSpPr>
@@ -13199,13 +13417,13 @@
         </p:sp>
         <p:sp>
           <p:nvSpPr>
-            <p:cNvPr id="259" name="pl259"/>
-            <p:cNvSpPr/>
-            <p:nvPr/>
-          </p:nvSpPr>
-          <p:spPr>
-            <a:xfrm>
-              <a:off x="550455" y="2614349"/>
+            <p:cNvPr id="264" name="pl264"/>
+            <p:cNvSpPr/>
+            <p:nvPr/>
+          </p:nvSpPr>
+          <p:spPr>
+            <a:xfrm>
+              <a:off x="550455" y="2599563"/>
               <a:ext cx="34794" cy="0"/>
             </a:xfrm>
             <a:custGeom>
@@ -13239,13 +13457,13 @@
         </p:sp>
         <p:sp>
           <p:nvSpPr>
-            <p:cNvPr id="260" name="pl260"/>
-            <p:cNvSpPr/>
-            <p:nvPr/>
-          </p:nvSpPr>
-          <p:spPr>
-            <a:xfrm>
-              <a:off x="550455" y="2402236"/>
+            <p:cNvPr id="265" name="pl265"/>
+            <p:cNvSpPr/>
+            <p:nvPr/>
+          </p:nvSpPr>
+          <p:spPr>
+            <a:xfrm>
+              <a:off x="550455" y="2425267"/>
               <a:ext cx="34794" cy="0"/>
             </a:xfrm>
             <a:custGeom>
@@ -13279,13 +13497,13 @@
         </p:sp>
         <p:sp>
           <p:nvSpPr>
-            <p:cNvPr id="261" name="pl261"/>
-            <p:cNvSpPr/>
-            <p:nvPr/>
-          </p:nvSpPr>
-          <p:spPr>
-            <a:xfrm>
-              <a:off x="550455" y="2190124"/>
+            <p:cNvPr id="266" name="pl266"/>
+            <p:cNvSpPr/>
+            <p:nvPr/>
+          </p:nvSpPr>
+          <p:spPr>
+            <a:xfrm>
+              <a:off x="550455" y="2250971"/>
               <a:ext cx="34794" cy="0"/>
             </a:xfrm>
             <a:custGeom>
@@ -13319,13 +13537,13 @@
         </p:sp>
         <p:sp>
           <p:nvSpPr>
-            <p:cNvPr id="262" name="pl262"/>
-            <p:cNvSpPr/>
-            <p:nvPr/>
-          </p:nvSpPr>
-          <p:spPr>
-            <a:xfrm>
-              <a:off x="550455" y="1978011"/>
+            <p:cNvPr id="267" name="pl267"/>
+            <p:cNvSpPr/>
+            <p:nvPr/>
+          </p:nvSpPr>
+          <p:spPr>
+            <a:xfrm>
+              <a:off x="550455" y="2076675"/>
               <a:ext cx="34794" cy="0"/>
             </a:xfrm>
             <a:custGeom>
@@ -13359,13 +13577,13 @@
         </p:sp>
         <p:sp>
           <p:nvSpPr>
-            <p:cNvPr id="263" name="pl263"/>
-            <p:cNvSpPr/>
-            <p:nvPr/>
-          </p:nvSpPr>
-          <p:spPr>
-            <a:xfrm>
-              <a:off x="550455" y="1765899"/>
+            <p:cNvPr id="268" name="pl268"/>
+            <p:cNvSpPr/>
+            <p:nvPr/>
+          </p:nvSpPr>
+          <p:spPr>
+            <a:xfrm>
+              <a:off x="550455" y="1902379"/>
               <a:ext cx="34794" cy="0"/>
             </a:xfrm>
             <a:custGeom>
@@ -13399,13 +13617,13 @@
         </p:sp>
         <p:sp>
           <p:nvSpPr>
-            <p:cNvPr id="264" name="pl264"/>
-            <p:cNvSpPr/>
-            <p:nvPr/>
-          </p:nvSpPr>
-          <p:spPr>
-            <a:xfrm>
-              <a:off x="550455" y="1553786"/>
+            <p:cNvPr id="269" name="pl269"/>
+            <p:cNvSpPr/>
+            <p:nvPr/>
+          </p:nvSpPr>
+          <p:spPr>
+            <a:xfrm>
+              <a:off x="550455" y="1728083"/>
               <a:ext cx="34794" cy="0"/>
             </a:xfrm>
             <a:custGeom>
@@ -13439,7 +13657,47 @@
         </p:sp>
         <p:sp>
           <p:nvSpPr>
-            <p:cNvPr id="265" name="tx265"/>
+            <p:cNvPr id="270" name="pl270"/>
+            <p:cNvSpPr/>
+            <p:nvPr/>
+          </p:nvSpPr>
+          <p:spPr>
+            <a:xfrm>
+              <a:off x="550455" y="1553786"/>
+              <a:ext cx="34794" cy="0"/>
+            </a:xfrm>
+            <a:custGeom>
+              <a:avLst/>
+              <a:pathLst>
+                <a:path w="34794" h="0">
+                  <a:moveTo>
+                    <a:pt x="0" y="0"/>
+                  </a:moveTo>
+                  <a:lnTo>
+                    <a:pt x="34794" y="0"/>
+                  </a:lnTo>
+                </a:path>
+              </a:pathLst>
+            </a:custGeom>
+            <a:ln w="13550" cap="flat">
+              <a:solidFill>
+                <a:srgbClr val="333333">
+                  <a:alpha val="100000"/>
+                </a:srgbClr>
+              </a:solidFill>
+              <a:prstDash val="solid"/>
+              <a:round/>
+            </a:ln>
+          </p:spPr>
+          <p:txBody>
+            <a:bodyPr/>
+            <a:lstStyle/>
+            <a:p/>
+          </p:txBody>
+        </p:sp>
+        <p:sp>
+          <p:nvSpPr>
+            <p:cNvPr id="271" name="tx271"/>
             <p:cNvSpPr/>
             <p:nvPr/>
           </p:nvSpPr>

</xml_diff>